<commit_message>
Add Changes suggested by Stephan Klee
</commit_message>
<xml_diff>
--- a/Diem25 Introduction DE.pptx
+++ b/Diem25 Introduction DE.pptx
@@ -69,17 +69,17 @@
           <a:noFill/>
         </a:ln>
         <a:solidFill>
-          <a:srgbClr val="FFFFFF"/>
+          <a:srgbClr val="000000"/>
         </a:solidFill>
         <a:effectLst/>
         <a:uFillTx/>
-        <a:latin typeface="+mn-lt"/>
-        <a:ea typeface="+mn-ea"/>
-        <a:cs typeface="+mn-cs"/>
+        <a:latin typeface="Helvetica Light"/>
+        <a:ea typeface="Helvetica Light"/>
+        <a:cs typeface="Helvetica Light"/>
         <a:sym typeface="Helvetica Light"/>
       </a:defRPr>
     </a:lvl1pPr>
-    <a:lvl2pPr marL="0" marR="0" indent="228600" algn="ctr" defTabSz="584200" rtl="0" fontAlgn="auto" latinLnBrk="0" hangingPunct="0">
+    <a:lvl2pPr marL="0" marR="0" indent="0" algn="ctr" defTabSz="584200" rtl="0" fontAlgn="auto" latinLnBrk="0" hangingPunct="0">
       <a:lnSpc>
         <a:spcPct val="100000"/>
       </a:lnSpc>
@@ -99,17 +99,17 @@
           <a:noFill/>
         </a:ln>
         <a:solidFill>
-          <a:srgbClr val="FFFFFF"/>
+          <a:srgbClr val="000000"/>
         </a:solidFill>
         <a:effectLst/>
         <a:uFillTx/>
-        <a:latin typeface="+mn-lt"/>
-        <a:ea typeface="+mn-ea"/>
-        <a:cs typeface="+mn-cs"/>
+        <a:latin typeface="Helvetica Light"/>
+        <a:ea typeface="Helvetica Light"/>
+        <a:cs typeface="Helvetica Light"/>
         <a:sym typeface="Helvetica Light"/>
       </a:defRPr>
     </a:lvl2pPr>
-    <a:lvl3pPr marL="0" marR="0" indent="457200" algn="ctr" defTabSz="584200" rtl="0" fontAlgn="auto" latinLnBrk="0" hangingPunct="0">
+    <a:lvl3pPr marL="0" marR="0" indent="0" algn="ctr" defTabSz="584200" rtl="0" fontAlgn="auto" latinLnBrk="0" hangingPunct="0">
       <a:lnSpc>
         <a:spcPct val="100000"/>
       </a:lnSpc>
@@ -129,17 +129,17 @@
           <a:noFill/>
         </a:ln>
         <a:solidFill>
-          <a:srgbClr val="FFFFFF"/>
+          <a:srgbClr val="000000"/>
         </a:solidFill>
         <a:effectLst/>
         <a:uFillTx/>
-        <a:latin typeface="+mn-lt"/>
-        <a:ea typeface="+mn-ea"/>
-        <a:cs typeface="+mn-cs"/>
+        <a:latin typeface="Helvetica Light"/>
+        <a:ea typeface="Helvetica Light"/>
+        <a:cs typeface="Helvetica Light"/>
         <a:sym typeface="Helvetica Light"/>
       </a:defRPr>
     </a:lvl3pPr>
-    <a:lvl4pPr marL="0" marR="0" indent="685800" algn="ctr" defTabSz="584200" rtl="0" fontAlgn="auto" latinLnBrk="0" hangingPunct="0">
+    <a:lvl4pPr marL="0" marR="0" indent="0" algn="ctr" defTabSz="584200" rtl="0" fontAlgn="auto" latinLnBrk="0" hangingPunct="0">
       <a:lnSpc>
         <a:spcPct val="100000"/>
       </a:lnSpc>
@@ -159,17 +159,17 @@
           <a:noFill/>
         </a:ln>
         <a:solidFill>
-          <a:srgbClr val="FFFFFF"/>
+          <a:srgbClr val="000000"/>
         </a:solidFill>
         <a:effectLst/>
         <a:uFillTx/>
-        <a:latin typeface="+mn-lt"/>
-        <a:ea typeface="+mn-ea"/>
-        <a:cs typeface="+mn-cs"/>
+        <a:latin typeface="Helvetica Light"/>
+        <a:ea typeface="Helvetica Light"/>
+        <a:cs typeface="Helvetica Light"/>
         <a:sym typeface="Helvetica Light"/>
       </a:defRPr>
     </a:lvl4pPr>
-    <a:lvl5pPr marL="0" marR="0" indent="914400" algn="ctr" defTabSz="584200" rtl="0" fontAlgn="auto" latinLnBrk="0" hangingPunct="0">
+    <a:lvl5pPr marL="0" marR="0" indent="0" algn="ctr" defTabSz="584200" rtl="0" fontAlgn="auto" latinLnBrk="0" hangingPunct="0">
       <a:lnSpc>
         <a:spcPct val="100000"/>
       </a:lnSpc>
@@ -189,17 +189,17 @@
           <a:noFill/>
         </a:ln>
         <a:solidFill>
-          <a:srgbClr val="FFFFFF"/>
+          <a:srgbClr val="000000"/>
         </a:solidFill>
         <a:effectLst/>
         <a:uFillTx/>
-        <a:latin typeface="+mn-lt"/>
-        <a:ea typeface="+mn-ea"/>
-        <a:cs typeface="+mn-cs"/>
+        <a:latin typeface="Helvetica Light"/>
+        <a:ea typeface="Helvetica Light"/>
+        <a:cs typeface="Helvetica Light"/>
         <a:sym typeface="Helvetica Light"/>
       </a:defRPr>
     </a:lvl5pPr>
-    <a:lvl6pPr marL="0" marR="0" indent="1143000" algn="ctr" defTabSz="584200" rtl="0" fontAlgn="auto" latinLnBrk="0" hangingPunct="0">
+    <a:lvl6pPr marL="0" marR="0" indent="0" algn="ctr" defTabSz="584200" rtl="0" fontAlgn="auto" latinLnBrk="0" hangingPunct="0">
       <a:lnSpc>
         <a:spcPct val="100000"/>
       </a:lnSpc>
@@ -219,17 +219,17 @@
           <a:noFill/>
         </a:ln>
         <a:solidFill>
-          <a:srgbClr val="FFFFFF"/>
+          <a:srgbClr val="000000"/>
         </a:solidFill>
         <a:effectLst/>
         <a:uFillTx/>
-        <a:latin typeface="+mn-lt"/>
-        <a:ea typeface="+mn-ea"/>
-        <a:cs typeface="+mn-cs"/>
+        <a:latin typeface="Helvetica Light"/>
+        <a:ea typeface="Helvetica Light"/>
+        <a:cs typeface="Helvetica Light"/>
         <a:sym typeface="Helvetica Light"/>
       </a:defRPr>
     </a:lvl6pPr>
-    <a:lvl7pPr marL="0" marR="0" indent="1371600" algn="ctr" defTabSz="584200" rtl="0" fontAlgn="auto" latinLnBrk="0" hangingPunct="0">
+    <a:lvl7pPr marL="0" marR="0" indent="0" algn="ctr" defTabSz="584200" rtl="0" fontAlgn="auto" latinLnBrk="0" hangingPunct="0">
       <a:lnSpc>
         <a:spcPct val="100000"/>
       </a:lnSpc>
@@ -249,17 +249,17 @@
           <a:noFill/>
         </a:ln>
         <a:solidFill>
-          <a:srgbClr val="FFFFFF"/>
+          <a:srgbClr val="000000"/>
         </a:solidFill>
         <a:effectLst/>
         <a:uFillTx/>
-        <a:latin typeface="+mn-lt"/>
-        <a:ea typeface="+mn-ea"/>
-        <a:cs typeface="+mn-cs"/>
+        <a:latin typeface="Helvetica Light"/>
+        <a:ea typeface="Helvetica Light"/>
+        <a:cs typeface="Helvetica Light"/>
         <a:sym typeface="Helvetica Light"/>
       </a:defRPr>
     </a:lvl7pPr>
-    <a:lvl8pPr marL="0" marR="0" indent="1600200" algn="ctr" defTabSz="584200" rtl="0" fontAlgn="auto" latinLnBrk="0" hangingPunct="0">
+    <a:lvl8pPr marL="0" marR="0" indent="0" algn="ctr" defTabSz="584200" rtl="0" fontAlgn="auto" latinLnBrk="0" hangingPunct="0">
       <a:lnSpc>
         <a:spcPct val="100000"/>
       </a:lnSpc>
@@ -279,17 +279,17 @@
           <a:noFill/>
         </a:ln>
         <a:solidFill>
-          <a:srgbClr val="FFFFFF"/>
+          <a:srgbClr val="000000"/>
         </a:solidFill>
         <a:effectLst/>
         <a:uFillTx/>
-        <a:latin typeface="+mn-lt"/>
-        <a:ea typeface="+mn-ea"/>
-        <a:cs typeface="+mn-cs"/>
+        <a:latin typeface="Helvetica Light"/>
+        <a:ea typeface="Helvetica Light"/>
+        <a:cs typeface="Helvetica Light"/>
         <a:sym typeface="Helvetica Light"/>
       </a:defRPr>
     </a:lvl8pPr>
-    <a:lvl9pPr marL="0" marR="0" indent="1828800" algn="ctr" defTabSz="584200" rtl="0" fontAlgn="auto" latinLnBrk="0" hangingPunct="0">
+    <a:lvl9pPr marL="0" marR="0" indent="0" algn="ctr" defTabSz="584200" rtl="0" fontAlgn="auto" latinLnBrk="0" hangingPunct="0">
       <a:lnSpc>
         <a:spcPct val="100000"/>
       </a:lnSpc>
@@ -309,13 +309,13 @@
           <a:noFill/>
         </a:ln>
         <a:solidFill>
-          <a:srgbClr val="FFFFFF"/>
+          <a:srgbClr val="000000"/>
         </a:solidFill>
         <a:effectLst/>
         <a:uFillTx/>
-        <a:latin typeface="+mn-lt"/>
-        <a:ea typeface="+mn-ea"/>
-        <a:cs typeface="+mn-cs"/>
+        <a:latin typeface="Helvetica Light"/>
+        <a:ea typeface="Helvetica Light"/>
+        <a:cs typeface="Helvetica Light"/>
         <a:sym typeface="Helvetica Light"/>
       </a:defRPr>
     </a:lvl9pPr>
@@ -403,9 +403,9 @@
         <a:spcPct val="117999"/>
       </a:lnSpc>
       <a:defRPr sz="2200">
-        <a:latin typeface="Helvetica Neue"/>
-        <a:ea typeface="Helvetica Neue"/>
-        <a:cs typeface="Helvetica Neue"/>
+        <a:latin typeface="+mj-lt"/>
+        <a:ea typeface="+mj-ea"/>
+        <a:cs typeface="+mj-cs"/>
         <a:sym typeface="Helvetica Neue"/>
       </a:defRPr>
     </a:lvl1pPr>
@@ -414,9 +414,9 @@
         <a:spcPct val="117999"/>
       </a:lnSpc>
       <a:defRPr sz="2200">
-        <a:latin typeface="Helvetica Neue"/>
-        <a:ea typeface="Helvetica Neue"/>
-        <a:cs typeface="Helvetica Neue"/>
+        <a:latin typeface="+mj-lt"/>
+        <a:ea typeface="+mj-ea"/>
+        <a:cs typeface="+mj-cs"/>
         <a:sym typeface="Helvetica Neue"/>
       </a:defRPr>
     </a:lvl2pPr>
@@ -425,9 +425,9 @@
         <a:spcPct val="117999"/>
       </a:lnSpc>
       <a:defRPr sz="2200">
-        <a:latin typeface="Helvetica Neue"/>
-        <a:ea typeface="Helvetica Neue"/>
-        <a:cs typeface="Helvetica Neue"/>
+        <a:latin typeface="+mj-lt"/>
+        <a:ea typeface="+mj-ea"/>
+        <a:cs typeface="+mj-cs"/>
         <a:sym typeface="Helvetica Neue"/>
       </a:defRPr>
     </a:lvl3pPr>
@@ -436,9 +436,9 @@
         <a:spcPct val="117999"/>
       </a:lnSpc>
       <a:defRPr sz="2200">
-        <a:latin typeface="Helvetica Neue"/>
-        <a:ea typeface="Helvetica Neue"/>
-        <a:cs typeface="Helvetica Neue"/>
+        <a:latin typeface="+mj-lt"/>
+        <a:ea typeface="+mj-ea"/>
+        <a:cs typeface="+mj-cs"/>
         <a:sym typeface="Helvetica Neue"/>
       </a:defRPr>
     </a:lvl4pPr>
@@ -447,9 +447,9 @@
         <a:spcPct val="117999"/>
       </a:lnSpc>
       <a:defRPr sz="2200">
-        <a:latin typeface="Helvetica Neue"/>
-        <a:ea typeface="Helvetica Neue"/>
-        <a:cs typeface="Helvetica Neue"/>
+        <a:latin typeface="+mj-lt"/>
+        <a:ea typeface="+mj-ea"/>
+        <a:cs typeface="+mj-cs"/>
         <a:sym typeface="Helvetica Neue"/>
       </a:defRPr>
     </a:lvl5pPr>
@@ -458,9 +458,9 @@
         <a:spcPct val="117999"/>
       </a:lnSpc>
       <a:defRPr sz="2200">
-        <a:latin typeface="Helvetica Neue"/>
-        <a:ea typeface="Helvetica Neue"/>
-        <a:cs typeface="Helvetica Neue"/>
+        <a:latin typeface="+mj-lt"/>
+        <a:ea typeface="+mj-ea"/>
+        <a:cs typeface="+mj-cs"/>
         <a:sym typeface="Helvetica Neue"/>
       </a:defRPr>
     </a:lvl6pPr>
@@ -469,9 +469,9 @@
         <a:spcPct val="117999"/>
       </a:lnSpc>
       <a:defRPr sz="2200">
-        <a:latin typeface="Helvetica Neue"/>
-        <a:ea typeface="Helvetica Neue"/>
-        <a:cs typeface="Helvetica Neue"/>
+        <a:latin typeface="+mj-lt"/>
+        <a:ea typeface="+mj-ea"/>
+        <a:cs typeface="+mj-cs"/>
         <a:sym typeface="Helvetica Neue"/>
       </a:defRPr>
     </a:lvl7pPr>
@@ -480,9 +480,9 @@
         <a:spcPct val="117999"/>
       </a:lnSpc>
       <a:defRPr sz="2200">
-        <a:latin typeface="Helvetica Neue"/>
-        <a:ea typeface="Helvetica Neue"/>
-        <a:cs typeface="Helvetica Neue"/>
+        <a:latin typeface="+mj-lt"/>
+        <a:ea typeface="+mj-ea"/>
+        <a:cs typeface="+mj-cs"/>
         <a:sym typeface="Helvetica Neue"/>
       </a:defRPr>
     </a:lvl8pPr>
@@ -491,9 +491,9 @@
         <a:spcPct val="117999"/>
       </a:lnSpc>
       <a:defRPr sz="2200">
-        <a:latin typeface="Helvetica Neue"/>
-        <a:ea typeface="Helvetica Neue"/>
-        <a:cs typeface="Helvetica Neue"/>
+        <a:latin typeface="+mj-lt"/>
+        <a:ea typeface="+mj-ea"/>
+        <a:cs typeface="+mj-cs"/>
         <a:sym typeface="Helvetica Neue"/>
       </a:defRPr>
     </a:lvl9pPr>
@@ -558,7 +558,13 @@
           <a:p>
             <a:pPr/>
             <a:r>
-              <a:t>Herzlich willkommen zur Präsentation von Diem25.</a:t>
+              <a:t>Herzlich willkommen zur Präsentation von </a:t>
+            </a:r>
+            <a:r>
+              <a:t>DiEM</a:t>
+            </a:r>
+            <a:r>
+              <a:t>25.</a:t>
             </a:r>
           </a:p>
           <a:p>
@@ -576,7 +582,13 @@
           <a:p>
             <a:pPr/>
             <a:r>
-              <a:t>Und dass es dafür Diem25 braucht.</a:t>
+              <a:t>Und dass es dafür </a:t>
+            </a:r>
+            <a:r>
+              <a:t>DiEM</a:t>
+            </a:r>
+            <a:r>
+              <a:t>25 braucht.</a:t>
             </a:r>
           </a:p>
           <a:p>
@@ -658,7 +670,25 @@
           <a:p>
             <a:pPr/>
             <a:r>
-              <a:t>Besucht die Diem25 Seite. Als erstes würde ich mir das Manifest ansehen. Eine Mitgliedschaft auf der Webseite gibt euch Zugriff auf das Diemforum. Zudem könnt ihr dann bei Diem25 internen Abstimmungen und Befragungen mitmachen. Alle die unser anliegen für mehr Transparenz in Europa unterstützen bitte ich zudem unsere Petition zu unterschreiben</a:t>
+              <a:t>Besucht die </a:t>
+            </a:r>
+            <a:r>
+              <a:t>DiEM</a:t>
+            </a:r>
+            <a:r>
+              <a:t>25 Seite. Als erstes würde ich mir das Manifest ansehen. Eine Mitgliedschaft auf der Webseite gibt euch Zugriff auf das </a:t>
+            </a:r>
+            <a:r>
+              <a:t>DiEM</a:t>
+            </a:r>
+            <a:r>
+              <a:t>forum. Zudem könnt ihr dann bei </a:t>
+            </a:r>
+            <a:r>
+              <a:t>DiEM</a:t>
+            </a:r>
+            <a:r>
+              <a:t>25 internen Abstimmungen und Befragungen mitmachen. Alle die unser anliegen für mehr Transparenz in Europa unterstützen bitte ich zudem unsere Petition zu unterschreiben</a:t>
             </a:r>
           </a:p>
           <a:p>
@@ -737,7 +767,13 @@
           <a:p>
             <a:pPr/>
             <a:r>
-              <a:t>Danke fürs zuhören. Ich hoffe ihr werdet bei euer Europadebatte an Diem25 denken.</a:t>
+              <a:t>Danke fürs zuhören. Ich hoffe ihr werdet bei euer Europadebatte an </a:t>
+            </a:r>
+            <a:r>
+              <a:t>DiEM</a:t>
+            </a:r>
+            <a:r>
+              <a:t>25 denken.</a:t>
             </a:r>
           </a:p>
         </p:txBody>
@@ -849,22 +885,40 @@
           <a:p>
             <a:pPr/>
             <a:r>
-              <a:t>War dann jahrelang eher tatenlos bis ich von Diem25 gehört habe.</a:t>
-            </a:r>
-          </a:p>
-          <a:p>
-            <a:pPr/>
-          </a:p>
-          <a:p>
-            <a:pPr/>
-            <a:r>
-              <a:t>Nun zu Diem25</a:t>
-            </a:r>
-          </a:p>
-          <a:p>
-            <a:pPr/>
-            <a:r>
-              <a:t>-&gt;Diem25 ist ein Bürgerbewegung zur Demokratisierung der EU.</a:t>
+              <a:t>War dann jahrelang eher tatenlos bis ich von </a:t>
+            </a:r>
+            <a:r>
+              <a:t>DiEM</a:t>
+            </a:r>
+            <a:r>
+              <a:t>25 gehört habe.</a:t>
+            </a:r>
+          </a:p>
+          <a:p>
+            <a:pPr/>
+          </a:p>
+          <a:p>
+            <a:pPr/>
+            <a:r>
+              <a:t>Nun zu </a:t>
+            </a:r>
+            <a:r>
+              <a:t>DiEM</a:t>
+            </a:r>
+            <a:r>
+              <a:t>25</a:t>
+            </a:r>
+          </a:p>
+          <a:p>
+            <a:pPr/>
+            <a:r>
+              <a:t>-&gt;</a:t>
+            </a:r>
+            <a:r>
+              <a:t>DiEM</a:t>
+            </a:r>
+            <a:r>
+              <a:t>25 ist ein Bürgerbewegung zur Demokratisierung der EU.</a:t>
             </a:r>
           </a:p>
           <a:p>
@@ -882,7 +936,7 @@
           <a:p>
             <a:pPr/>
             <a:r>
-              <a:t>Diem25 spricht als Bürgerbewegung Einzelpersonen an und nicht Parteien oder NGOs. Ich glaube jedoch, dass Diem25 enorm davon profitiert wenn Personen aus einem möglichst breiten Spektrum mitmachen. Dazu gehören nicht zuletzt auch Parteien und NGOs</a:t>
+              <a:t>DiEM25 spricht als Bürgerbewegung Einzelpersonen an und nicht Parteien oder NGOs. Ich glaube jedoch, dass DiEM25 enorm davon profitiert wenn Personen aus einem möglichst breiten Spektrum mitmachen. Dazu gehören nicht zuletzt auch Parteien und NGOs</a:t>
             </a:r>
           </a:p>
           <a:p>
@@ -894,33 +948,25 @@
           <a:p>
             <a:pPr/>
             <a:r>
-              <a:t>Darüber entscheiden soll eine von Diem25 einberufene verfassungsgebende Versammlung</a:t>
-            </a:r>
-          </a:p>
-          <a:p>
-            <a:pPr/>
-            <a:r>
-              <a:t>-&gt;Diem25 wurde auf Initiative von Yanis Varoufakis, Srecko Horvat und Lorenzo Marsili gegründet</a:t>
-            </a:r>
-          </a:p>
-          <a:p>
-            <a:pPr/>
-            <a:r>
-              <a:rPr b="1"/>
-              <a:t>Janis Varoufakis </a:t>
-            </a:r>
-            <a:r>
-              <a:t>-&gt; Werden die meisten kennen. War griechischer Finanzminister für Syriza und versuchte bessere Bedingungen für die Rückzahlung der Schulden an die EU auszuhandeln. Ist auch Ökonom und Autor vieler Bücher</a:t>
-            </a:r>
-          </a:p>
-          <a:p>
-            <a:pPr/>
-            <a:r>
-              <a:rPr b="1"/>
-              <a:t>Srecko Horvat</a:t>
-            </a:r>
-            <a:r>
-              <a:t> ist Kroatischer Philosoph und Author und Organisator des Subversive Festival in Zagreb</a:t>
+              <a:t>Darüber entscheiden soll eine von </a:t>
+            </a:r>
+            <a:r>
+              <a:t>DiEM</a:t>
+            </a:r>
+            <a:r>
+              <a:t>25 einberufene verfassungsgebende Versammlung</a:t>
+            </a:r>
+          </a:p>
+          <a:p>
+            <a:pPr/>
+            <a:r>
+              <a:t>-&gt;</a:t>
+            </a:r>
+            <a:r>
+              <a:t>DiEM</a:t>
+            </a:r>
+            <a:r>
+              <a:t>25 wurde auf Initiative von Yanis Varoufakis, Srecko Horvat und Lorenzo Marsili gegründet</a:t>
             </a:r>
           </a:p>
           <a:p>
@@ -928,11 +974,11 @@
               <a:defRPr b="1"/>
             </a:pPr>
             <a:r>
-              <a:t>Lorenzo Marsili </a:t>
+              <a:t>Janis Varoufakis </a:t>
             </a:r>
             <a:r>
               <a:rPr b="0"/>
-              <a:t>Gründer der Organisation European Alternatives</a:t>
+              <a:t>-&gt; Werden die meisten kennen. War griechischer Finanzminister für Syriza und versuchte bessere Bedingungen für die Rückzahlung der Schulden an die EU auszuhandeln. Ist auch Ökonom und Autor vieler Bücher</a:t>
             </a:r>
             <a:endParaRPr b="0"/>
           </a:p>
@@ -940,7 +986,30 @@
             <a:pPr>
               <a:defRPr b="1"/>
             </a:pPr>
+            <a:r>
+              <a:t>Srecko Horvat</a:t>
+            </a:r>
+            <a:r>
+              <a:rPr b="0"/>
+              <a:t> ist Kroatischer Philosoph und Author und Organisator des Subversive Festival in Zagreb</a:t>
+            </a:r>
             <a:endParaRPr b="0"/>
+          </a:p>
+          <a:p>
+            <a:pPr>
+              <a:defRPr b="1"/>
+            </a:pPr>
+            <a:r>
+              <a:t>Lorenzo Marsili </a:t>
+            </a:r>
+            <a:r>
+              <a:rPr b="0"/>
+              <a:t>Gründer der Organisation European Alternatives</a:t>
+            </a:r>
+          </a:p>
+          <a:p>
+            <a:pPr/>
+            <a:endParaRPr b="1"/>
           </a:p>
           <a:p>
             <a:pPr>
@@ -1053,87 +1122,96 @@
             </a:r>
           </a:p>
           <a:p>
+            <a:pPr/>
+            <a:r>
+              <a:t>Konkret einerseits</a:t>
+            </a:r>
+            <a:r>
+              <a:rPr b="1"/>
+              <a:t> Liveübertragung von Sitzungen aller EU-Gremien und bereitstellen der Sitzungsprotokolle </a:t>
+            </a:r>
+            <a:r>
+              <a:t>und</a:t>
+            </a:r>
+            <a:endParaRPr b="1"/>
+          </a:p>
+          <a:p>
             <a:pPr>
               <a:defRPr b="1"/>
             </a:pPr>
             <a:r>
-              <a:rPr b="0"/>
-              <a:t>Konkret einerseits</a:t>
-            </a:r>
-            <a:r>
-              <a:t> Liveübertragung von Sitzungen aller EU-Gremien und bereitstellen der Sitzungsprotokolle </a:t>
-            </a:r>
-            <a:r>
-              <a:rPr b="0"/>
-              <a:t>und</a:t>
-            </a:r>
+              <a:t>Nachträgliche Veröffentlichungen der Sitzungsprotokolle der EZB</a:t>
+            </a:r>
+          </a:p>
+          <a:p>
+            <a:pPr/>
+            <a:r>
+              <a:t>Heute ist es so, dass zum Beispiel die Eurogruppe, die über Austheritätsmassnhahmen Entscheidet nicht einmal Sitzungsprotokolle führt. Daher ist es möglich, dass ein Yanis Varoufakis und ein Wolfgang Schäuble, dass Gegenteil über die Ereignisse bei den Verhandlungen behaupten können, ohne das jemand je die Wahrheit erfährt</a:t>
+            </a:r>
+          </a:p>
+          <a:p>
+            <a:pPr/>
+            <a:r>
+              <a:t>Zu diesem Thema ist eine Petition mit aktuell 78'000 Unterschriften am laufen.</a:t>
+            </a:r>
+          </a:p>
+          <a:p>
+            <a:pPr/>
           </a:p>
           <a:p>
             <a:pPr>
               <a:defRPr b="1"/>
             </a:pPr>
             <a:r>
-              <a:t>Nachträgliche Veröffentlichungen der Sitzungsprotokolle der EZB</a:t>
-            </a:r>
-          </a:p>
-          <a:p>
-            <a:pPr/>
-            <a:r>
-              <a:t>Heute ist es so, dass zum Beispiel die Eurogruppe, die über Austheritätsmassnhahmen Entscheidet nicht einmal Sitzungsprotokolle führt. Daher ist es möglich, dass ein Yanis Varoufakis und ein Wolfgang Schäuble, dass Gegenteil über die Ereignisse bei den Verhandlungen behaupten können, ohne das jemand je die Wahrheit erfährt</a:t>
-            </a:r>
-          </a:p>
-          <a:p>
-            <a:pPr/>
-            <a:r>
-              <a:t>Zu diesem Thema ist eine Petition mit aktuell 78'000 Unterschriften am laufen.</a:t>
-            </a:r>
-          </a:p>
-          <a:p>
-            <a:pPr/>
+              <a:t>Mittelfristig </a:t>
+            </a:r>
+            <a:r>
+              <a:rPr b="0"/>
+              <a:t>fordern wir, dass die</a:t>
+            </a:r>
           </a:p>
           <a:p>
             <a:pPr>
               <a:defRPr b="1"/>
             </a:pPr>
             <a:r>
-              <a:t>Mittelfristig </a:t>
+              <a:t>Aktuelle Wirtschaftskrise mit den bestehenden Institutionen und im Rahmen der bestehenden EU-Verträge </a:t>
             </a:r>
             <a:r>
               <a:rPr b="0"/>
-              <a:t>fordern wir, dass die</a:t>
-            </a:r>
-            <a:endParaRPr b="0"/>
+              <a:t>angegangen wird.</a:t>
+            </a:r>
+          </a:p>
+          <a:p>
+            <a:pPr/>
+            <a:r>
+              <a:t>Ziel hier ist ein Ausgleich, zwischen Strukturstarken und Strukturschwachen Regionen. Wie es auchin einem Nationalstaat üblich ist. Beispiele in der Schweiz dafür sind die Arbeitslossenversicherung, die die Last von den Betroffenen Kantone dem Bund übergibt oder der Kantonale Finanzausgleich. Diese Mechanismen sind in einem grossen Binnenmarkt vielleicht noch wichtiger als in einem Nationalstaat. sie garantieren Mittelfristig auch den Wohlstand der Wirtschaftlich starken Regionen, da die Wirtschaft auf kaufkräftige Konsumenten angewiesen ist. Die aktuelle Krise in der EU hat sehr viel damit zu tun, dass die EU zu wenig funktionierende Mechanismen in diese Richtung hat. Dies wäre innerhalb der EU bereits heute Umsetzbar ohne die Verträge zu ändern. Eine  Mögliche Lösung hat Yanis Varoufakis in einem Dokument ausgearbeitet. Es heisst eine Bescheidener Vorschlag zur Lösung der Eurokrise. Kopien davon stehen zur Verfügung. Ein konkreter Vorschlag wir von </a:t>
+            </a:r>
+            <a:r>
+              <a:t>DiEM</a:t>
+            </a:r>
+            <a:r>
+              <a:t>25 im Moment ausgearbeitet.</a:t>
+            </a:r>
           </a:p>
           <a:p>
             <a:pPr>
               <a:defRPr b="1"/>
             </a:pPr>
             <a:r>
-              <a:t>Aktuelle Wirtschaftskrise mit den bestehenden Institutionen und im Rahmen der bestehenden EU-Verträge </a:t>
-            </a:r>
-            <a:r>
-              <a:rPr b="0"/>
-              <a:t>angegangen wird.</a:t>
-            </a:r>
-          </a:p>
-          <a:p>
-            <a:pPr/>
-            <a:r>
-              <a:t>Ziel hier ist ein Ausgleich, zwischen Strukturstarken und Strukturschwachen Regionen. Wie es auchin einem Nationalstaat üblich ist. Beispiele in der Schweiz dafür sind die Arbeitslossenversicherung, die die Last von den Betroffenen Kantone dem Bund übergibt oder der Kantonale Finanzausgleich. Diese Mechanismen sind in einem grossen Binnenmarkt vielleicht noch wichtiger als in einem Nationalstaat. sie garantieren Mittelfristig auch den Wohlstand der Wirtschaftlich starken Regionen, da die Wirtschaft auf kaufkräftige Konsumenten angewiesen ist. Die aktuelle Krise in der EU hat sehr viel damit zu tun, dass die EU zu wenig funktionierende Mechanismen in diese Richtung hat. Dies wäre innerhalb der EU bereits heute Umsetzbar ohne die Verträge zu ändern. Eine  Mögliche Lösung hat Yanis Varoufakis in einem Dokument ausgearbeitet. Es heisst eine Bescheidener Vorschlag zur Lösung der Eurokrise. Kopien davon stehen zur Verfügung. Ein konkreter Vorschlag wir von Diem25 im Moment ausgearbeitet.</a:t>
-            </a:r>
-          </a:p>
-          <a:p>
-            <a:pPr>
-              <a:defRPr b="1"/>
-            </a:pPr>
-            <a:r>
               <a:t>Wahl einer Verfassungsgebenden Versammlung</a:t>
             </a:r>
           </a:p>
           <a:p>
             <a:pPr/>
             <a:r>
-              <a:t>Diese Wird von allen Diem25 Mitglieder gewählt und Arbeitet eine EU Verfassung aus.</a:t>
+              <a:t>Diese Wird von allen </a:t>
+            </a:r>
+            <a:r>
+              <a:t>DiEM</a:t>
+            </a:r>
+            <a:r>
+              <a:t>25 Mitglieder gewählt und Arbeitet eine EU Verfassung aus.</a:t>
             </a:r>
           </a:p>
           <a:p>
@@ -1239,33 +1317,29 @@
             </a:pPr>
           </a:p>
           <a:p>
+            <a:pPr/>
+            <a:r>
+              <a:t>Die</a:t>
+            </a:r>
+            <a:r>
+              <a:rPr b="1"/>
+              <a:t> </a:t>
+            </a:r>
+            <a:r>
+              <a:t>Macht der Nationalstaaten in Europa ist seit Jahrzehnten am schwinden</a:t>
+            </a:r>
+          </a:p>
+          <a:p>
+            <a:pPr/>
+            <a:r>
+              <a:t>Immer mehr Kompetenzen werden von den Nationalstaaten auf EU Ebene übertragen. Gutes Beispiel sind die Länder der Eurozone, die     keine eigene Währungspolitik mehr machen können. </a:t>
+            </a:r>
+          </a:p>
+          <a:p>
             <a:pPr>
               <a:defRPr b="1"/>
             </a:pPr>
             <a:r>
-              <a:rPr b="0"/>
-              <a:t>Die</a:t>
-            </a:r>
-            <a:r>
-              <a:t> </a:t>
-            </a:r>
-            <a:r>
-              <a:rPr b="0"/>
-              <a:t>Macht der Nationalstaaten in Europa ist seit Jahrzehnten am schwinden</a:t>
-            </a:r>
-            <a:endParaRPr b="0"/>
-          </a:p>
-          <a:p>
-            <a:pPr/>
-            <a:r>
-              <a:t>Immer mehr Kompetenzen werden von den Nationalstaaten auf EU Ebene übertragen. Gutes Beispiel sind die Länder der Eurozone, die     keine eigene Währungspolitik mehr machen können. </a:t>
-            </a:r>
-          </a:p>
-          <a:p>
-            <a:pPr>
-              <a:defRPr b="1"/>
-            </a:pPr>
-            <a:r>
               <a:t>Die Macht von multinationalen Konzernen hat stark zugenommen. </a:t>
             </a:r>
             <a:r>
@@ -1277,10 +1351,7 @@
           <a:p>
             <a:pPr/>
             <a:r>
-              <a:t>als</a:t>
-            </a:r>
-            <a:r>
-              <a:t> Folge der deregulierungen der letzten Jahrzehnte haben multinationale Konzerne viel mehr Macht und können Ländern Bedingungen diktieren. Nur relativ grosse Länder oder Länderverbunde wie die EU können sich einigermassen dagegen wehren.</a:t>
+              <a:t>als Folge der deregulierungen der letzten Jahrzehnte haben multinationale Konzerne viel mehr Macht und können Ländern Bedingungen diktieren. Nur relativ grosse Länder oder Länderverbunde wie die EU können sich einigermassen dagegen wehren.</a:t>
             </a:r>
           </a:p>
           <a:p>
@@ -1425,6 +1496,7 @@
           </a:p>
           <a:p>
             <a:pPr/>
+            <a:endParaRPr b="1"/>
           </a:p>
           <a:p>
             <a:pPr/>
@@ -1433,7 +1505,7 @@
             </a:r>
             <a:r>
               <a:rPr b="1"/>
-              <a:t>noch authoritärer agiert</a:t>
+              <a:t>noch autoritärer agiert</a:t>
             </a:r>
             <a:r>
               <a:t>. Dann ist damit zu rechnen, dass die Situation sich weiter zuspitzt. Das heisst, die Nationalstaaten verlieren weiter an Einfluss und die wichtigen Entscheide werden zunehmend in der undemokratischen EU gefällt. </a:t>
@@ -1451,9 +1523,11 @@
               <a:rPr b="1"/>
               <a:t>Schrittweiser zerfall der EU</a:t>
             </a:r>
-          </a:p>
-          <a:p>
-            <a:pPr/>
+            <a:endParaRPr b="1"/>
+          </a:p>
+          <a:p>
+            <a:pPr/>
+            <a:endParaRPr b="1"/>
           </a:p>
           <a:p>
             <a:pPr/>
@@ -1476,7 +1550,7 @@
           <a:p>
             <a:pPr/>
             <a:r>
-              <a:t>Wir glauben, dass eine Starke, Demokratische EU eine Grundvoraussetzung ist um uns aus dieser Situation zu befreien. Sie gibt der Demokratie  wieder die Mittel in die Hand sich gegen Multionationale Konzerne durchzusetzen. Wenn statt Technokraten die Entscheide von einem Demokratisch gewählten EU Parlament gefällt werden verleiht Ihnen das an Legitimität. Die Bürger füllen sich nicht mehr Machtlos und gewinnen Vertrauen in die Politik. Die EU Wirtschaftspolitik wird gemeinsam und gleichberechtigt ausgehandelt. Dues wird sie hoffentlich Vernünftiger und breiter akzeptiert machen. Dies entzieht dem Rechtsextremismus den Nährboden.</a:t>
+              <a:t>Wir glauben, dass eine Starke, Demokratische EU eine Grundvoraussetzung ist um uns aus dieser Situation zu befreien. Sie gibt der Demokratie  wieder die Mittel in die Hand sich gegen Multinationale Konzerne durchzusetzen. Wenn statt Technokraten die Entscheide von einem Demokratisch gewählten EU Parlament gefällt werden verleiht Ihnen das an Legitimität. Die Bürger füllen sich nicht mehr Machtlos und gewinnen Vertrauen in die Politik. Die EU Wirtschaftspolitik wird gemeinsam und gleichberechtigt ausgehandelt. Dues wird sie hoffentlich Vernünftiger und breiter akzeptiert machen. Dies entzieht dem Rechtsextremismus den Nährboden.</a:t>
             </a:r>
           </a:p>
         </p:txBody>
@@ -1546,7 +1620,13 @@
           <a:p>
             <a:pPr/>
             <a:r>
-              <a:t>Vielleicht denkt ihr in der Zwischenzeit das ist ja alles schön und gut aber warum sollte Diem25 das Schaffen. </a:t>
+              <a:t>Vielleicht denkt ihr in der Zwischenzeit das ist ja alles schön und gut aber warum sollte </a:t>
+            </a:r>
+            <a:r>
+              <a:t>DiEM</a:t>
+            </a:r>
+            <a:r>
+              <a:t>25 das Schaffen. </a:t>
             </a:r>
           </a:p>
         </p:txBody>
@@ -1616,16 +1696,22 @@
           <a:p>
             <a:pPr/>
             <a:r>
-              <a:t>Einerseits ist die Entwicklung ganz gut angelaufen. Diem25 hat bereits über 17’000 Mitglieder. Viele Personen aus allen Ecken von Europa haben sich uns angeschlossen. Rechts ist eine Karte von Ortsgruppen. Irgendwo klein auf dieser Karte ist auch die Schweiz zu sehen. Aktuell gibt es eine Lokalgruppe in Genf. In der Deutschschweiz gibt es viele interessierte um Zürich, Basel und Bern aber noch nicht genug Personen um eine Lokalgruppe zu Gründen. Alle Schweizer Mitglieder treffen sich ungefähr jeden Monat. </a:t>
-            </a:r>
-          </a:p>
-          <a:p>
-            <a:pPr/>
-          </a:p>
-          <a:p>
-            <a:pPr/>
-            <a:r>
-              <a:t>Diem25 hat bei seiner Gründung einen neuen Ansatz gewählt. Meistens versuchen Nationale Gruppen sich auf Europäischer Ebene zu vernetzen oder es wird auf Nationaler Ebene eine Gruppe gegründet um auf Europäischer Ebene etwas zu erreichen und erst danach versucht man das ganze International zu etablieren Diem25 hingegen wurde von Personen aus ganz Europa Gegründet und arbeitet nun daran seine Basis auszuweiten. Deshalb ist Diem25 von </a:t>
+              <a:t>Einerseits ist die Entwicklung ganz gut angelaufen. </a:t>
+            </a:r>
+            <a:r>
+              <a:t>DiEM</a:t>
+            </a:r>
+            <a:r>
+              <a:t>25 hat bereits über 17’000 Mitglieder. Viele Personen aus allen Ecken von Europa haben sich uns angeschlossen. Rechts ist eine Karte von Ortsgruppen. Irgendwo klein auf dieser Karte ist auch die Schweiz zu sehen. Aktuell gibt es eine Lokalgruppe in Genf. In der Deutschschweiz gibt es viele interessierte um Zürich, Basel und Bern aber noch nicht genug Personen um eine Lokalgruppe zu Gründen. Alle Schweizer Mitglieder treffen sich ungefähr jeden Monat. </a:t>
+            </a:r>
+          </a:p>
+          <a:p>
+            <a:pPr/>
+          </a:p>
+          <a:p>
+            <a:pPr/>
+            <a:r>
+              <a:t>DiEM25 hat bei seiner Gründung einen neuen Ansatz gewählt. Meistens versuchen Nationale Gruppen sich auf Europäischer Ebene zu vernetzen oder es wird auf Nationaler Ebene eine Gruppe gegründet um auf Europäischer Ebene etwas zu erreichen und erst danach versucht man das ganze International zu etablieren DiEM25 hingegen wurde von Personen aus ganz Europa Gegründet und arbeitet nun daran seine Basis auszuweiten. Deshalb ist DiEM25 von </a:t>
             </a:r>
             <a:r>
               <a:rPr b="1"/>
@@ -1634,9 +1720,6 @@
             <a:r>
               <a:t>Das tönt nicht nur gut, nach uns bringt das auch gewisse Vorteile. Wir sind keine nationale Organisation mit einer nationalen Agenda, die sich nebenbei noch auf europäischer Ebene engagiert. Wir sind freier auf Europäischer Ebene zu handeln und auf Ereignisse in Europa, auch ausserhalb der Schweiz zu reagieren </a:t>
             </a:r>
-          </a:p>
-          <a:p>
-            <a:pPr/>
           </a:p>
         </p:txBody>
       </p:sp>
@@ -1705,25 +1788,49 @@
           <a:p>
             <a:pPr/>
             <a:r>
-              <a:t>Viele unserer Mitglieder sind bekannte Persönlichkeiten aus Politik und Kultur. Dies kann Diem25 auch helfen sich Gehör zu verschaffen.</a:t>
-            </a:r>
-          </a:p>
-          <a:p>
-            <a:pPr/>
-          </a:p>
-          <a:p>
-            <a:pPr/>
-            <a:r>
-              <a:t>Ganz Links ist Yanis Varoufakis. Er ist Professor für Ökonomie, war für sechs Monate Finanzminister von Griechenland. In Diem25 ist er Mitglied des Coordination Councils, eine Art exekutive von Diem25. </a:t>
-            </a:r>
-          </a:p>
-          <a:p>
-            <a:pPr/>
-          </a:p>
-          <a:p>
-            <a:pPr/>
-            <a:r>
-              <a:t>Daneben ist Slavoj Zizek. Ein Slowenischer Philosoph und Schriftsteller. Er ist Mitglied des “Advisory Panels”. Ein beratendes Organ von Diem25.</a:t>
+              <a:t>Viele unserer Mitglieder sind bekannte Persönlichkeiten aus Politik und Kultur. Dies kann </a:t>
+            </a:r>
+            <a:r>
+              <a:t>DiEM</a:t>
+            </a:r>
+            <a:r>
+              <a:t>25 auch helfen sich Gehör zu verschaffen.</a:t>
+            </a:r>
+          </a:p>
+          <a:p>
+            <a:pPr/>
+          </a:p>
+          <a:p>
+            <a:pPr/>
+            <a:r>
+              <a:t>Ganz Links ist Yanis Varoufakis. Er ist Professor für Ökonomie, war für sechs Monate Finanzminister von Griechenland. In </a:t>
+            </a:r>
+            <a:r>
+              <a:t>DiEM</a:t>
+            </a:r>
+            <a:r>
+              <a:t>25 ist er Mitglied des Coordination Councils, eine Art exekutive von </a:t>
+            </a:r>
+            <a:r>
+              <a:t>DiEM</a:t>
+            </a:r>
+            <a:r>
+              <a:t>25. </a:t>
+            </a:r>
+          </a:p>
+          <a:p>
+            <a:pPr/>
+          </a:p>
+          <a:p>
+            <a:pPr/>
+            <a:r>
+              <a:t>Daneben ist Slavoj Zizek. Ein Slowenischer Philosoph und Schriftsteller. Er ist Mitglied des “Advisory Panels”. Ein beratendes Organ von </a:t>
+            </a:r>
+            <a:r>
+              <a:t>DiEM</a:t>
+            </a:r>
+            <a:r>
+              <a:t>25.</a:t>
             </a:r>
           </a:p>
           <a:p>
@@ -1741,16 +1848,28 @@
           <a:p>
             <a:pPr/>
             <a:r>
-              <a:t>“Noam Chomsky” ist ein amerikanischer Schriftsteller, Aktivist und Professor für Linguistik. Er ist Mitglied des “Coordination Councils” in Diem25.</a:t>
-            </a:r>
-          </a:p>
-          <a:p>
-            <a:pPr/>
-          </a:p>
-          <a:p>
-            <a:pPr/>
-            <a:r>
-              <a:t>“Ken Loach" ist ein Britischer Filmregisseur und Drehbuchauthor. Er ist Mitglied des Advisory Panels in Diem25</a:t>
+              <a:t>“Noam Chomsky” ist ein amerikanischer Schriftsteller, Aktivist und Professor für Linguistik. Er ist Mitglied des “Coordination Councils” in </a:t>
+            </a:r>
+            <a:r>
+              <a:t>DiEM</a:t>
+            </a:r>
+            <a:r>
+              <a:t>25.</a:t>
+            </a:r>
+          </a:p>
+          <a:p>
+            <a:pPr/>
+          </a:p>
+          <a:p>
+            <a:pPr/>
+            <a:r>
+              <a:t>“Ken Loach" ist ein Britischer Filmregisseur und Drehbuchauthor. Er ist Mitglied des Advisory Panels in </a:t>
+            </a:r>
+            <a:r>
+              <a:t>DiEM</a:t>
+            </a:r>
+            <a:r>
+              <a:t>25</a:t>
             </a:r>
           </a:p>
         </p:txBody>
@@ -1826,7 +1945,13 @@
           <a:p>
             <a:pPr/>
             <a:r>
-              <a:t>Einerseits möchten wir unser Netzwerk ausbauen. Ich glaube jeder der sich bei Diem25 und oder einer unseren Facebookgruppe anmeldet zählt. Dies führt dazu, dass wir mehr gehört werden und, dass Personen sich einklinken können, falls etwas passiert, dass sie interessiert. Zudem können wir so auch lokale Initiativen unterstützen wenn sie eine Europäische Relevanz haben. </a:t>
+              <a:t>Einerseits möchten wir unser Netzwerk ausbauen. Ich glaube jeder der sich bei </a:t>
+            </a:r>
+            <a:r>
+              <a:t>DiEM</a:t>
+            </a:r>
+            <a:r>
+              <a:t>25 und oder einer unseren Facebookgruppe anmeldet zählt. Dies führt dazu, dass wir mehr gehört werden und, dass Personen sich einklinken können, falls etwas passiert, dass sie interessiert. Zudem können wir so auch lokale Initiativen unterstützen wenn sie eine Europäische Relevanz haben. </a:t>
             </a:r>
           </a:p>
           <a:p>
@@ -1868,7 +1993,13 @@
           <a:p>
             <a:pPr/>
             <a:r>
-              <a:t>-Und nicht zuletzt möchten wir gerne eine Lokalgruppe in Thun oder Bern Gründen um Diem25 aktiver zu unterstützen</a:t>
+              <a:t>-Und nicht zuletzt möchten wir gerne eine Lokalgruppe in Thun oder Bern Gründen um </a:t>
+            </a:r>
+            <a:r>
+              <a:t>DiEM</a:t>
+            </a:r>
+            <a:r>
+              <a:t>25 aktiver zu unterstützen</a:t>
             </a:r>
           </a:p>
         </p:txBody>
@@ -1882,7 +2013,7 @@
 </file>
 
 <file path=ppt/slideLayouts/slideLayout1.xml><?xml version="1.0" encoding="utf-8"?>
-<p:sldLayout xmlns:a="http://schemas.openxmlformats.org/drawingml/2006/main" xmlns:r="http://schemas.openxmlformats.org/officeDocument/2006/relationships" xmlns:p="http://schemas.openxmlformats.org/presentationml/2006/main" type="title" showMasterSp="0" showMasterPhAnim="1">
+<p:sldLayout xmlns:a="http://schemas.openxmlformats.org/drawingml/2006/main" xmlns:r="http://schemas.openxmlformats.org/officeDocument/2006/relationships" xmlns:p="http://schemas.openxmlformats.org/presentationml/2006/main" type="tx" showMasterSp="0" showMasterPhAnim="1">
   <p:cSld name="Title &amp; Subtitle">
     <p:bg>
       <p:bgPr>
@@ -1943,7 +2074,7 @@
       </p:sp>
       <p:pic>
         <p:nvPicPr>
-          <p:cNvPr id="13" name="Diem25-Logo.png"/>
+          <p:cNvPr id="13" name="image3.png"/>
           <p:cNvPicPr>
             <a:picLocks noChangeAspect="1"/>
           </p:cNvPicPr>
@@ -1978,8 +2109,8 @@
         </p:nvSpPr>
         <p:spPr>
           <a:xfrm>
-            <a:off x="5886538" y="3600450"/>
-            <a:ext cx="291923" cy="1066800"/>
+            <a:off x="5886537" y="3600450"/>
+            <a:ext cx="291924" cy="1066800"/>
           </a:xfrm>
           <a:prstGeom prst="rect">
             <a:avLst/>
@@ -1999,7 +2130,11 @@
           </a:bodyPr>
           <a:lstStyle>
             <a:lvl1pPr algn="l">
-              <a:defRPr sz="6300"/>
+              <a:defRPr sz="6300">
+                <a:solidFill>
+                  <a:srgbClr val="FFFFFF"/>
+                </a:solidFill>
+              </a:defRPr>
             </a:lvl1pPr>
           </a:lstStyle>
           <a:p>
@@ -2103,7 +2238,7 @@
       </p:sp>
       <p:pic>
         <p:nvPicPr>
-          <p:cNvPr id="23" name="Diem25-Logo.png"/>
+          <p:cNvPr id="23" name="image3.png"/>
           <p:cNvPicPr>
             <a:picLocks noChangeAspect="1"/>
           </p:cNvPicPr>
@@ -2138,8 +2273,8 @@
         </p:nvSpPr>
         <p:spPr>
           <a:xfrm>
-            <a:off x="5886538" y="3600450"/>
-            <a:ext cx="291923" cy="1066800"/>
+            <a:off x="5886537" y="3600450"/>
+            <a:ext cx="291924" cy="1066800"/>
           </a:xfrm>
           <a:prstGeom prst="rect">
             <a:avLst/>
@@ -2159,7 +2294,11 @@
           </a:bodyPr>
           <a:lstStyle>
             <a:lvl1pPr algn="l">
-              <a:defRPr sz="6300"/>
+              <a:defRPr sz="6300">
+                <a:solidFill>
+                  <a:srgbClr val="FFFFFF"/>
+                </a:solidFill>
+              </a:defRPr>
             </a:lvl1pPr>
           </a:lstStyle>
           <a:p>
@@ -2175,38 +2314,49 @@
           <p:cNvPr id="25" name="Shape 25"/>
           <p:cNvSpPr/>
           <p:nvPr>
-            <p:ph type="body" sz="quarter" idx="13"/>
+            <p:ph type="body" sz="quarter" idx="1"/>
           </p:nvPr>
         </p:nvSpPr>
         <p:spPr>
           <a:xfrm>
-            <a:off x="1445592" y="7924800"/>
-            <a:ext cx="9751964" cy="469900"/>
+            <a:off x="1445591" y="7924800"/>
+            <a:ext cx="9751965" cy="469900"/>
           </a:xfrm>
           <a:prstGeom prst="rect">
             <a:avLst/>
           </a:prstGeom>
         </p:spPr>
         <p:txBody>
-          <a:bodyPr anchor="t">
-            <a:spAutoFit/>
-          </a:bodyPr>
+          <a:bodyPr anchor="t"/>
           <a:lstStyle/>
           <a:p>
-            <a:pPr lvl="1" marL="0" indent="228600" algn="ctr">
-              <a:spcBef>
-                <a:spcPts val="0"/>
-              </a:spcBef>
-              <a:buSzTx/>
-              <a:buNone/>
-              <a:defRPr i="1" sz="2400">
-                <a:solidFill>
-                  <a:srgbClr val="FFFFFF"/>
-                </a:solidFill>
-              </a:defRPr>
-            </a:pPr>
-            <a:r>
-              <a:t>–Johnny Appleseed</a:t>
+            <a:pPr/>
+            <a:r>
+              <a:t>Body Level One</a:t>
+            </a:r>
+          </a:p>
+          <a:p>
+            <a:pPr lvl="1"/>
+            <a:r>
+              <a:t>Body Level Two</a:t>
+            </a:r>
+          </a:p>
+          <a:p>
+            <a:pPr lvl="2"/>
+            <a:r>
+              <a:t>Body Level Three</a:t>
+            </a:r>
+          </a:p>
+          <a:p>
+            <a:pPr lvl="3"/>
+            <a:r>
+              <a:t>Body Level Four</a:t>
+            </a:r>
+          </a:p>
+          <a:p>
+            <a:pPr lvl="4"/>
+            <a:r>
+              <a:t>Body Level Five</a:t>
             </a:r>
           </a:p>
         </p:txBody>
@@ -2216,7 +2366,7 @@
           <p:cNvPr id="26" name="Shape 26"/>
           <p:cNvSpPr/>
           <p:nvPr>
-            <p:ph type="body" sz="quarter" idx="14"/>
+            <p:ph type="body" sz="quarter" idx="13"/>
           </p:nvPr>
         </p:nvSpPr>
         <p:spPr>
@@ -2229,11 +2379,10 @@
           </a:prstGeom>
         </p:spPr>
         <p:txBody>
-          <a:bodyPr>
-            <a:spAutoFit/>
-          </a:bodyPr>
-          <a:lstStyle>
-            <a:lvl1pPr marL="0" indent="0" algn="ctr">
+          <a:bodyPr/>
+          <a:lstStyle/>
+          <a:p>
+            <a:pPr marL="0" indent="0" algn="ctr">
               <a:spcBef>
                 <a:spcPts val="0"/>
               </a:spcBef>
@@ -2244,13 +2393,7 @@
                   <a:srgbClr val="FFFFFF"/>
                 </a:solidFill>
               </a:defRPr>
-            </a:lvl1pPr>
-          </a:lstStyle>
-          <a:p>
-            <a:pPr/>
-            <a:r>
-              <a:t>“Type a quote here.” </a:t>
-            </a:r>
+            </a:pPr>
           </a:p>
         </p:txBody>
       </p:sp>
@@ -2458,7 +2601,7 @@
         <p:spPr>
           <a:xfrm>
             <a:off x="635000" y="887561"/>
-            <a:ext cx="11099800" cy="2159001"/>
+            <a:ext cx="11099800" cy="1320801"/>
           </a:xfrm>
           <a:prstGeom prst="rect">
             <a:avLst/>
@@ -2479,12 +2622,9 @@
           <a:lstStyle>
             <a:lvl1pPr algn="l">
               <a:defRPr sz="8000">
-                <a:solidFill>
-                  <a:srgbClr val="000000"/>
-                </a:solidFill>
-                <a:latin typeface="Helvetica"/>
-                <a:ea typeface="Helvetica"/>
-                <a:cs typeface="Helvetica"/>
+                <a:latin typeface="+mn-lt"/>
+                <a:ea typeface="+mn-ea"/>
+                <a:cs typeface="+mn-cs"/>
                 <a:sym typeface="Helvetica"/>
               </a:defRPr>
             </a:lvl1pPr>
@@ -2505,8 +2645,8 @@
         </p:nvSpPr>
         <p:spPr>
           <a:xfrm>
-            <a:off x="88900" y="2590800"/>
-            <a:ext cx="6495505" cy="6286500"/>
+            <a:off x="88899" y="3155950"/>
+            <a:ext cx="6495507" cy="5156201"/>
           </a:xfrm>
           <a:prstGeom prst="rect">
             <a:avLst/>
@@ -2531,11 +2671,7 @@
               </a:spcBef>
               <a:buSzPct val="75000"/>
               <a:buChar char="•"/>
-              <a:defRPr sz="3800">
-                <a:solidFill>
-                  <a:srgbClr val="000000"/>
-                </a:solidFill>
-              </a:defRPr>
+              <a:defRPr sz="3800"/>
             </a:lvl1pPr>
             <a:lvl2pPr marL="889000" indent="-444500" algn="l">
               <a:spcBef>
@@ -2543,11 +2679,7 @@
               </a:spcBef>
               <a:buSzPct val="75000"/>
               <a:buChar char="•"/>
-              <a:defRPr sz="3800">
-                <a:solidFill>
-                  <a:srgbClr val="000000"/>
-                </a:solidFill>
-              </a:defRPr>
+              <a:defRPr sz="3800"/>
             </a:lvl2pPr>
             <a:lvl3pPr marL="1333500" indent="-444500" algn="l">
               <a:spcBef>
@@ -2555,11 +2687,7 @@
               </a:spcBef>
               <a:buSzPct val="75000"/>
               <a:buChar char="•"/>
-              <a:defRPr sz="3800">
-                <a:solidFill>
-                  <a:srgbClr val="000000"/>
-                </a:solidFill>
-              </a:defRPr>
+              <a:defRPr sz="3800"/>
             </a:lvl3pPr>
             <a:lvl4pPr marL="1778000" indent="-444500" algn="l">
               <a:spcBef>
@@ -2567,11 +2695,7 @@
               </a:spcBef>
               <a:buSzPct val="75000"/>
               <a:buChar char="•"/>
-              <a:defRPr sz="3800">
-                <a:solidFill>
-                  <a:srgbClr val="000000"/>
-                </a:solidFill>
-              </a:defRPr>
+              <a:defRPr sz="3800"/>
             </a:lvl4pPr>
             <a:lvl5pPr marL="2222500" indent="-444500" algn="l">
               <a:spcBef>
@@ -2579,11 +2703,7 @@
               </a:spcBef>
               <a:buSzPct val="75000"/>
               <a:buChar char="•"/>
-              <a:defRPr sz="3800">
-                <a:solidFill>
-                  <a:srgbClr val="000000"/>
-                </a:solidFill>
-              </a:defRPr>
+              <a:defRPr sz="3800"/>
             </a:lvl5pPr>
           </a:lstStyle>
           <a:p>
@@ -2620,7 +2740,7 @@
       </p:sp>
       <p:pic>
         <p:nvPicPr>
-          <p:cNvPr id="46" name="Logo_Regular.png"/>
+          <p:cNvPr id="46" name="image2.png"/>
           <p:cNvPicPr>
             <a:picLocks noChangeAspect="1"/>
           </p:cNvPicPr>
@@ -2637,7 +2757,7 @@
         <p:spPr>
           <a:xfrm>
             <a:off x="8746601" y="1183600"/>
-            <a:ext cx="3534300" cy="728723"/>
+            <a:ext cx="3534301" cy="728724"/>
           </a:xfrm>
           <a:prstGeom prst="rect">
             <a:avLst/>
@@ -2702,9 +2822,38 @@
           <a:chExt cx="0" cy="0"/>
         </a:xfrm>
       </p:grpSpPr>
+      <p:pic>
+        <p:nvPicPr>
+          <p:cNvPr id="2" name="image2.png"/>
+          <p:cNvPicPr>
+            <a:picLocks noChangeAspect="1"/>
+          </p:cNvPicPr>
+          <p:nvPr/>
+        </p:nvPicPr>
+        <p:blipFill>
+          <a:blip r:embed="rId2">
+            <a:extLst/>
+          </a:blip>
+          <a:stretch>
+            <a:fillRect/>
+          </a:stretch>
+        </p:blipFill>
+        <p:spPr>
+          <a:xfrm>
+            <a:off x="8746601" y="1183600"/>
+            <a:ext cx="3534301" cy="728724"/>
+          </a:xfrm>
+          <a:prstGeom prst="rect">
+            <a:avLst/>
+          </a:prstGeom>
+          <a:ln w="12700">
+            <a:miter lim="400000"/>
+          </a:ln>
+        </p:spPr>
+      </p:pic>
       <p:sp>
         <p:nvSpPr>
-          <p:cNvPr id="2" name="Shape 2"/>
+          <p:cNvPr id="3" name="Shape 3"/>
           <p:cNvSpPr/>
           <p:nvPr>
             <p:ph type="title"/>
@@ -2713,7 +2862,7 @@
         <p:spPr>
           <a:xfrm>
             <a:off x="635000" y="887561"/>
-            <a:ext cx="11099800" cy="2159001"/>
+            <a:ext cx="11099800" cy="2159002"/>
           </a:xfrm>
           <a:prstGeom prst="rect">
             <a:avLst/>
@@ -2742,7 +2891,7 @@
       </p:sp>
       <p:sp>
         <p:nvSpPr>
-          <p:cNvPr id="3" name="Shape 3"/>
+          <p:cNvPr id="4" name="Shape 4"/>
           <p:cNvSpPr/>
           <p:nvPr>
             <p:ph type="body" idx="1"/>
@@ -2802,35 +2951,6 @@
           </a:p>
         </p:txBody>
       </p:sp>
-      <p:pic>
-        <p:nvPicPr>
-          <p:cNvPr id="4" name="Logo_Regular.png"/>
-          <p:cNvPicPr>
-            <a:picLocks noChangeAspect="1"/>
-          </p:cNvPicPr>
-          <p:nvPr/>
-        </p:nvPicPr>
-        <p:blipFill>
-          <a:blip r:embed="rId2">
-            <a:extLst/>
-          </a:blip>
-          <a:stretch>
-            <a:fillRect/>
-          </a:stretch>
-        </p:blipFill>
-        <p:spPr>
-          <a:xfrm>
-            <a:off x="8746601" y="1183600"/>
-            <a:ext cx="3534300" cy="728723"/>
-          </a:xfrm>
-          <a:prstGeom prst="rect">
-            <a:avLst/>
-          </a:prstGeom>
-          <a:ln w="12700">
-            <a:miter lim="400000"/>
-          </a:ln>
-        </p:spPr>
-      </p:pic>
       <p:sp>
         <p:nvSpPr>
           <p:cNvPr id="5" name="Shape 5"/>
@@ -2857,7 +2977,11 @@
           </a:bodyPr>
           <a:lstStyle>
             <a:lvl1pPr>
-              <a:defRPr sz="1800"/>
+              <a:defRPr sz="1800">
+                <a:solidFill>
+                  <a:srgbClr val="FFFFFF"/>
+                </a:solidFill>
+              </a:defRPr>
             </a:lvl1pPr>
           </a:lstStyle>
           <a:p>
@@ -2868,7 +2992,7 @@
       </p:sp>
     </p:spTree>
   </p:cSld>
-  <p:clrMap bg1="dk1" tx1="lt1" bg2="dk2" tx2="lt2" accent1="accent1" accent2="accent2" accent3="accent3" accent4="accent4" accent5="accent5" accent6="accent6" hlink="hlink" folHlink="folHlink"/>
+  <p:clrMap bg1="lt1" tx1="dk1" bg2="lt2" tx2="dk2" accent1="accent1" accent2="accent2" accent3="accent3" accent4="accent4" accent5="accent5" accent6="accent6" hlink="hlink" folHlink="folHlink"/>
   <p:sldLayoutIdLst>
     <p:sldLayoutId id="2147483649" r:id="rId3"/>
     <p:sldLayoutId id="2147483650" r:id="rId4"/>
@@ -2878,7 +3002,7 @@
   <p:transition xmlns:p14="http://schemas.microsoft.com/office/powerpoint/2010/main" spd="med" advClick="1"/>
   <p:txStyles>
     <p:titleStyle>
-      <a:lvl1pPr marL="0" marR="0" indent="0" algn="l" defTabSz="584200" latinLnBrk="0">
+      <a:lvl1pPr marL="0" marR="0" indent="0" algn="l" defTabSz="584200" rtl="0" latinLnBrk="0">
         <a:lnSpc>
           <a:spcPct val="100000"/>
         </a:lnSpc>
@@ -2901,13 +3025,13 @@
             <a:srgbClr val="000000"/>
           </a:solidFill>
           <a:uFillTx/>
-          <a:latin typeface="Helvetica"/>
-          <a:ea typeface="Helvetica"/>
-          <a:cs typeface="Helvetica"/>
+          <a:latin typeface="+mn-lt"/>
+          <a:ea typeface="+mn-ea"/>
+          <a:cs typeface="+mn-cs"/>
           <a:sym typeface="Helvetica"/>
         </a:defRPr>
       </a:lvl1pPr>
-      <a:lvl2pPr marL="0" marR="0" indent="228600" algn="l" defTabSz="584200" latinLnBrk="0">
+      <a:lvl2pPr marL="0" marR="0" indent="0" algn="l" defTabSz="584200" rtl="0" latinLnBrk="0">
         <a:lnSpc>
           <a:spcPct val="100000"/>
         </a:lnSpc>
@@ -2930,13 +3054,13 @@
             <a:srgbClr val="000000"/>
           </a:solidFill>
           <a:uFillTx/>
-          <a:latin typeface="Helvetica"/>
-          <a:ea typeface="Helvetica"/>
-          <a:cs typeface="Helvetica"/>
+          <a:latin typeface="+mn-lt"/>
+          <a:ea typeface="+mn-ea"/>
+          <a:cs typeface="+mn-cs"/>
           <a:sym typeface="Helvetica"/>
         </a:defRPr>
       </a:lvl2pPr>
-      <a:lvl3pPr marL="0" marR="0" indent="457200" algn="l" defTabSz="584200" latinLnBrk="0">
+      <a:lvl3pPr marL="0" marR="0" indent="0" algn="l" defTabSz="584200" rtl="0" latinLnBrk="0">
         <a:lnSpc>
           <a:spcPct val="100000"/>
         </a:lnSpc>
@@ -2959,13 +3083,13 @@
             <a:srgbClr val="000000"/>
           </a:solidFill>
           <a:uFillTx/>
-          <a:latin typeface="Helvetica"/>
-          <a:ea typeface="Helvetica"/>
-          <a:cs typeface="Helvetica"/>
+          <a:latin typeface="+mn-lt"/>
+          <a:ea typeface="+mn-ea"/>
+          <a:cs typeface="+mn-cs"/>
           <a:sym typeface="Helvetica"/>
         </a:defRPr>
       </a:lvl3pPr>
-      <a:lvl4pPr marL="0" marR="0" indent="685800" algn="l" defTabSz="584200" latinLnBrk="0">
+      <a:lvl4pPr marL="0" marR="0" indent="0" algn="l" defTabSz="584200" rtl="0" latinLnBrk="0">
         <a:lnSpc>
           <a:spcPct val="100000"/>
         </a:lnSpc>
@@ -2988,13 +3112,13 @@
             <a:srgbClr val="000000"/>
           </a:solidFill>
           <a:uFillTx/>
-          <a:latin typeface="Helvetica"/>
-          <a:ea typeface="Helvetica"/>
-          <a:cs typeface="Helvetica"/>
+          <a:latin typeface="+mn-lt"/>
+          <a:ea typeface="+mn-ea"/>
+          <a:cs typeface="+mn-cs"/>
           <a:sym typeface="Helvetica"/>
         </a:defRPr>
       </a:lvl4pPr>
-      <a:lvl5pPr marL="0" marR="0" indent="914400" algn="l" defTabSz="584200" latinLnBrk="0">
+      <a:lvl5pPr marL="0" marR="0" indent="0" algn="l" defTabSz="584200" rtl="0" latinLnBrk="0">
         <a:lnSpc>
           <a:spcPct val="100000"/>
         </a:lnSpc>
@@ -3017,13 +3141,13 @@
             <a:srgbClr val="000000"/>
           </a:solidFill>
           <a:uFillTx/>
-          <a:latin typeface="Helvetica"/>
-          <a:ea typeface="Helvetica"/>
-          <a:cs typeface="Helvetica"/>
+          <a:latin typeface="+mn-lt"/>
+          <a:ea typeface="+mn-ea"/>
+          <a:cs typeface="+mn-cs"/>
           <a:sym typeface="Helvetica"/>
         </a:defRPr>
       </a:lvl5pPr>
-      <a:lvl6pPr marL="0" marR="0" indent="1143000" algn="l" defTabSz="584200" latinLnBrk="0">
+      <a:lvl6pPr marL="0" marR="0" indent="0" algn="l" defTabSz="584200" rtl="0" latinLnBrk="0">
         <a:lnSpc>
           <a:spcPct val="100000"/>
         </a:lnSpc>
@@ -3046,13 +3170,13 @@
             <a:srgbClr val="000000"/>
           </a:solidFill>
           <a:uFillTx/>
-          <a:latin typeface="Helvetica"/>
-          <a:ea typeface="Helvetica"/>
-          <a:cs typeface="Helvetica"/>
+          <a:latin typeface="+mn-lt"/>
+          <a:ea typeface="+mn-ea"/>
+          <a:cs typeface="+mn-cs"/>
           <a:sym typeface="Helvetica"/>
         </a:defRPr>
       </a:lvl6pPr>
-      <a:lvl7pPr marL="0" marR="0" indent="1371600" algn="l" defTabSz="584200" latinLnBrk="0">
+      <a:lvl7pPr marL="0" marR="0" indent="0" algn="l" defTabSz="584200" rtl="0" latinLnBrk="0">
         <a:lnSpc>
           <a:spcPct val="100000"/>
         </a:lnSpc>
@@ -3075,13 +3199,13 @@
             <a:srgbClr val="000000"/>
           </a:solidFill>
           <a:uFillTx/>
-          <a:latin typeface="Helvetica"/>
-          <a:ea typeface="Helvetica"/>
-          <a:cs typeface="Helvetica"/>
+          <a:latin typeface="+mn-lt"/>
+          <a:ea typeface="+mn-ea"/>
+          <a:cs typeface="+mn-cs"/>
           <a:sym typeface="Helvetica"/>
         </a:defRPr>
       </a:lvl7pPr>
-      <a:lvl8pPr marL="0" marR="0" indent="1600200" algn="l" defTabSz="584200" latinLnBrk="0">
+      <a:lvl8pPr marL="0" marR="0" indent="0" algn="l" defTabSz="584200" rtl="0" latinLnBrk="0">
         <a:lnSpc>
           <a:spcPct val="100000"/>
         </a:lnSpc>
@@ -3104,13 +3228,13 @@
             <a:srgbClr val="000000"/>
           </a:solidFill>
           <a:uFillTx/>
-          <a:latin typeface="Helvetica"/>
-          <a:ea typeface="Helvetica"/>
-          <a:cs typeface="Helvetica"/>
+          <a:latin typeface="+mn-lt"/>
+          <a:ea typeface="+mn-ea"/>
+          <a:cs typeface="+mn-cs"/>
           <a:sym typeface="Helvetica"/>
         </a:defRPr>
       </a:lvl8pPr>
-      <a:lvl9pPr marL="0" marR="0" indent="1828800" algn="l" defTabSz="584200" latinLnBrk="0">
+      <a:lvl9pPr marL="0" marR="0" indent="0" algn="l" defTabSz="584200" rtl="0" latinLnBrk="0">
         <a:lnSpc>
           <a:spcPct val="100000"/>
         </a:lnSpc>
@@ -3133,15 +3257,15 @@
             <a:srgbClr val="000000"/>
           </a:solidFill>
           <a:uFillTx/>
-          <a:latin typeface="Helvetica"/>
-          <a:ea typeface="Helvetica"/>
-          <a:cs typeface="Helvetica"/>
+          <a:latin typeface="+mn-lt"/>
+          <a:ea typeface="+mn-ea"/>
+          <a:cs typeface="+mn-cs"/>
           <a:sym typeface="Helvetica"/>
         </a:defRPr>
       </a:lvl9pPr>
     </p:titleStyle>
     <p:bodyStyle>
-      <a:lvl1pPr marL="444500" marR="0" indent="-444500" algn="l" defTabSz="584200" latinLnBrk="0">
+      <a:lvl1pPr marL="444500" marR="0" indent="-444500" algn="l" defTabSz="584200" rtl="0" latinLnBrk="0">
         <a:lnSpc>
           <a:spcPct val="100000"/>
         </a:lnSpc>
@@ -3164,13 +3288,13 @@
             <a:srgbClr val="000000"/>
           </a:solidFill>
           <a:uFillTx/>
-          <a:latin typeface="+mn-lt"/>
-          <a:ea typeface="+mn-ea"/>
-          <a:cs typeface="+mn-cs"/>
+          <a:latin typeface="Helvetica Light"/>
+          <a:ea typeface="Helvetica Light"/>
+          <a:cs typeface="Helvetica Light"/>
           <a:sym typeface="Helvetica Light"/>
         </a:defRPr>
       </a:lvl1pPr>
-      <a:lvl2pPr marL="889000" marR="0" indent="-444500" algn="l" defTabSz="584200" latinLnBrk="0">
+      <a:lvl2pPr marL="889000" marR="0" indent="-444500" algn="l" defTabSz="584200" rtl="0" latinLnBrk="0">
         <a:lnSpc>
           <a:spcPct val="100000"/>
         </a:lnSpc>
@@ -3193,13 +3317,13 @@
             <a:srgbClr val="000000"/>
           </a:solidFill>
           <a:uFillTx/>
-          <a:latin typeface="+mn-lt"/>
-          <a:ea typeface="+mn-ea"/>
-          <a:cs typeface="+mn-cs"/>
+          <a:latin typeface="Helvetica Light"/>
+          <a:ea typeface="Helvetica Light"/>
+          <a:cs typeface="Helvetica Light"/>
           <a:sym typeface="Helvetica Light"/>
         </a:defRPr>
       </a:lvl2pPr>
-      <a:lvl3pPr marL="1333500" marR="0" indent="-444500" algn="l" defTabSz="584200" latinLnBrk="0">
+      <a:lvl3pPr marL="1333500" marR="0" indent="-444500" algn="l" defTabSz="584200" rtl="0" latinLnBrk="0">
         <a:lnSpc>
           <a:spcPct val="100000"/>
         </a:lnSpc>
@@ -3222,13 +3346,13 @@
             <a:srgbClr val="000000"/>
           </a:solidFill>
           <a:uFillTx/>
-          <a:latin typeface="+mn-lt"/>
-          <a:ea typeface="+mn-ea"/>
-          <a:cs typeface="+mn-cs"/>
+          <a:latin typeface="Helvetica Light"/>
+          <a:ea typeface="Helvetica Light"/>
+          <a:cs typeface="Helvetica Light"/>
           <a:sym typeface="Helvetica Light"/>
         </a:defRPr>
       </a:lvl3pPr>
-      <a:lvl4pPr marL="1778000" marR="0" indent="-444500" algn="l" defTabSz="584200" latinLnBrk="0">
+      <a:lvl4pPr marL="1778000" marR="0" indent="-444500" algn="l" defTabSz="584200" rtl="0" latinLnBrk="0">
         <a:lnSpc>
           <a:spcPct val="100000"/>
         </a:lnSpc>
@@ -3251,13 +3375,13 @@
             <a:srgbClr val="000000"/>
           </a:solidFill>
           <a:uFillTx/>
-          <a:latin typeface="+mn-lt"/>
-          <a:ea typeface="+mn-ea"/>
-          <a:cs typeface="+mn-cs"/>
+          <a:latin typeface="Helvetica Light"/>
+          <a:ea typeface="Helvetica Light"/>
+          <a:cs typeface="Helvetica Light"/>
           <a:sym typeface="Helvetica Light"/>
         </a:defRPr>
       </a:lvl4pPr>
-      <a:lvl5pPr marL="2222500" marR="0" indent="-444500" algn="l" defTabSz="584200" latinLnBrk="0">
+      <a:lvl5pPr marL="2222500" marR="0" indent="-444500" algn="l" defTabSz="584200" rtl="0" latinLnBrk="0">
         <a:lnSpc>
           <a:spcPct val="100000"/>
         </a:lnSpc>
@@ -3280,13 +3404,13 @@
             <a:srgbClr val="000000"/>
           </a:solidFill>
           <a:uFillTx/>
-          <a:latin typeface="+mn-lt"/>
-          <a:ea typeface="+mn-ea"/>
-          <a:cs typeface="+mn-cs"/>
+          <a:latin typeface="Helvetica Light"/>
+          <a:ea typeface="Helvetica Light"/>
+          <a:cs typeface="Helvetica Light"/>
           <a:sym typeface="Helvetica Light"/>
         </a:defRPr>
       </a:lvl5pPr>
-      <a:lvl6pPr marL="2667000" marR="0" indent="-444500" algn="l" defTabSz="584200" latinLnBrk="0">
+      <a:lvl6pPr marL="2667000" marR="0" indent="-444500" algn="l" defTabSz="584200" rtl="0" latinLnBrk="0">
         <a:lnSpc>
           <a:spcPct val="100000"/>
         </a:lnSpc>
@@ -3309,13 +3433,13 @@
             <a:srgbClr val="000000"/>
           </a:solidFill>
           <a:uFillTx/>
-          <a:latin typeface="+mn-lt"/>
-          <a:ea typeface="+mn-ea"/>
-          <a:cs typeface="+mn-cs"/>
+          <a:latin typeface="Helvetica Light"/>
+          <a:ea typeface="Helvetica Light"/>
+          <a:cs typeface="Helvetica Light"/>
           <a:sym typeface="Helvetica Light"/>
         </a:defRPr>
       </a:lvl6pPr>
-      <a:lvl7pPr marL="3111500" marR="0" indent="-444500" algn="l" defTabSz="584200" latinLnBrk="0">
+      <a:lvl7pPr marL="3111500" marR="0" indent="-444500" algn="l" defTabSz="584200" rtl="0" latinLnBrk="0">
         <a:lnSpc>
           <a:spcPct val="100000"/>
         </a:lnSpc>
@@ -3338,13 +3462,13 @@
             <a:srgbClr val="000000"/>
           </a:solidFill>
           <a:uFillTx/>
-          <a:latin typeface="+mn-lt"/>
-          <a:ea typeface="+mn-ea"/>
-          <a:cs typeface="+mn-cs"/>
+          <a:latin typeface="Helvetica Light"/>
+          <a:ea typeface="Helvetica Light"/>
+          <a:cs typeface="Helvetica Light"/>
           <a:sym typeface="Helvetica Light"/>
         </a:defRPr>
       </a:lvl7pPr>
-      <a:lvl8pPr marL="3556000" marR="0" indent="-444500" algn="l" defTabSz="584200" latinLnBrk="0">
+      <a:lvl8pPr marL="3556000" marR="0" indent="-444500" algn="l" defTabSz="584200" rtl="0" latinLnBrk="0">
         <a:lnSpc>
           <a:spcPct val="100000"/>
         </a:lnSpc>
@@ -3367,13 +3491,13 @@
             <a:srgbClr val="000000"/>
           </a:solidFill>
           <a:uFillTx/>
-          <a:latin typeface="+mn-lt"/>
-          <a:ea typeface="+mn-ea"/>
-          <a:cs typeface="+mn-cs"/>
+          <a:latin typeface="Helvetica Light"/>
+          <a:ea typeface="Helvetica Light"/>
+          <a:cs typeface="Helvetica Light"/>
           <a:sym typeface="Helvetica Light"/>
         </a:defRPr>
       </a:lvl8pPr>
-      <a:lvl9pPr marL="4000500" marR="0" indent="-444500" algn="l" defTabSz="584200" latinLnBrk="0">
+      <a:lvl9pPr marL="4000500" marR="0" indent="-444500" algn="l" defTabSz="584200" rtl="0" latinLnBrk="0">
         <a:lnSpc>
           <a:spcPct val="100000"/>
         </a:lnSpc>
@@ -3396,9 +3520,9 @@
             <a:srgbClr val="000000"/>
           </a:solidFill>
           <a:uFillTx/>
-          <a:latin typeface="+mn-lt"/>
-          <a:ea typeface="+mn-ea"/>
-          <a:cs typeface="+mn-cs"/>
+          <a:latin typeface="Helvetica Light"/>
+          <a:ea typeface="Helvetica Light"/>
+          <a:cs typeface="Helvetica Light"/>
           <a:sym typeface="Helvetica Light"/>
         </a:defRPr>
       </a:lvl9pPr>
@@ -3433,7 +3557,7 @@
           <a:sym typeface="Helvetica Light"/>
         </a:defRPr>
       </a:lvl1pPr>
-      <a:lvl2pPr marL="0" marR="0" indent="228600" algn="ctr" defTabSz="584200" rtl="0" latinLnBrk="0">
+      <a:lvl2pPr marL="0" marR="0" indent="0" algn="ctr" defTabSz="584200" rtl="0" latinLnBrk="0">
         <a:lnSpc>
           <a:spcPct val="100000"/>
         </a:lnSpc>
@@ -3462,7 +3586,7 @@
           <a:sym typeface="Helvetica Light"/>
         </a:defRPr>
       </a:lvl2pPr>
-      <a:lvl3pPr marL="0" marR="0" indent="457200" algn="ctr" defTabSz="584200" rtl="0" latinLnBrk="0">
+      <a:lvl3pPr marL="0" marR="0" indent="0" algn="ctr" defTabSz="584200" rtl="0" latinLnBrk="0">
         <a:lnSpc>
           <a:spcPct val="100000"/>
         </a:lnSpc>
@@ -3491,7 +3615,7 @@
           <a:sym typeface="Helvetica Light"/>
         </a:defRPr>
       </a:lvl3pPr>
-      <a:lvl4pPr marL="0" marR="0" indent="685800" algn="ctr" defTabSz="584200" rtl="0" latinLnBrk="0">
+      <a:lvl4pPr marL="0" marR="0" indent="0" algn="ctr" defTabSz="584200" rtl="0" latinLnBrk="0">
         <a:lnSpc>
           <a:spcPct val="100000"/>
         </a:lnSpc>
@@ -3520,7 +3644,7 @@
           <a:sym typeface="Helvetica Light"/>
         </a:defRPr>
       </a:lvl4pPr>
-      <a:lvl5pPr marL="0" marR="0" indent="914400" algn="ctr" defTabSz="584200" rtl="0" latinLnBrk="0">
+      <a:lvl5pPr marL="0" marR="0" indent="0" algn="ctr" defTabSz="584200" rtl="0" latinLnBrk="0">
         <a:lnSpc>
           <a:spcPct val="100000"/>
         </a:lnSpc>
@@ -3549,7 +3673,7 @@
           <a:sym typeface="Helvetica Light"/>
         </a:defRPr>
       </a:lvl5pPr>
-      <a:lvl6pPr marL="0" marR="0" indent="1143000" algn="ctr" defTabSz="584200" rtl="0" latinLnBrk="0">
+      <a:lvl6pPr marL="0" marR="0" indent="0" algn="ctr" defTabSz="584200" rtl="0" latinLnBrk="0">
         <a:lnSpc>
           <a:spcPct val="100000"/>
         </a:lnSpc>
@@ -3578,7 +3702,7 @@
           <a:sym typeface="Helvetica Light"/>
         </a:defRPr>
       </a:lvl6pPr>
-      <a:lvl7pPr marL="0" marR="0" indent="1371600" algn="ctr" defTabSz="584200" rtl="0" latinLnBrk="0">
+      <a:lvl7pPr marL="0" marR="0" indent="0" algn="ctr" defTabSz="584200" rtl="0" latinLnBrk="0">
         <a:lnSpc>
           <a:spcPct val="100000"/>
         </a:lnSpc>
@@ -3607,7 +3731,7 @@
           <a:sym typeface="Helvetica Light"/>
         </a:defRPr>
       </a:lvl7pPr>
-      <a:lvl8pPr marL="0" marR="0" indent="1600200" algn="ctr" defTabSz="584200" rtl="0" latinLnBrk="0">
+      <a:lvl8pPr marL="0" marR="0" indent="0" algn="ctr" defTabSz="584200" rtl="0" latinLnBrk="0">
         <a:lnSpc>
           <a:spcPct val="100000"/>
         </a:lnSpc>
@@ -3636,7 +3760,7 @@
           <a:sym typeface="Helvetica Light"/>
         </a:defRPr>
       </a:lvl8pPr>
-      <a:lvl9pPr marL="0" marR="0" indent="1828800" algn="ctr" defTabSz="584200" rtl="0" latinLnBrk="0">
+      <a:lvl9pPr marL="0" marR="0" indent="0" algn="ctr" defTabSz="584200" rtl="0" latinLnBrk="0">
         <a:lnSpc>
           <a:spcPct val="100000"/>
         </a:lnSpc>
@@ -3692,7 +3816,7 @@
           <p:cNvPr id="56" name="Shape 56"/>
           <p:cNvSpPr/>
           <p:nvPr>
-            <p:ph type="ctrTitle"/>
+            <p:ph type="title"/>
           </p:nvPr>
         </p:nvSpPr>
         <p:spPr>
@@ -3705,7 +3829,7 @@
           <a:lstStyle/>
           <a:p>
             <a:pPr defTabSz="397256">
-              <a:defRPr sz="3264"/>
+              <a:defRPr sz="3200"/>
             </a:pPr>
             <a:r>
               <a:t>Ein demokratisches </a:t>
@@ -3713,7 +3837,7 @@
           </a:p>
           <a:p>
             <a:pPr defTabSz="397256">
-              <a:defRPr sz="3264"/>
+              <a:defRPr sz="3200"/>
             </a:pPr>
             <a:r>
               <a:t>Europa ist möglich</a:t>
@@ -3758,7 +3882,7 @@
         <p:spPr>
           <a:xfrm>
             <a:off x="635000" y="887561"/>
-            <a:ext cx="8022954" cy="2159001"/>
+            <a:ext cx="8022953" cy="2159002"/>
           </a:xfrm>
           <a:prstGeom prst="rect">
             <a:avLst/>
@@ -3784,6 +3908,10 @@
           </p:nvPr>
         </p:nvSpPr>
         <p:spPr>
+          <a:xfrm>
+            <a:off x="453727" y="2590800"/>
+            <a:ext cx="12241362" cy="6286500"/>
+          </a:xfrm>
           <a:prstGeom prst="rect">
             <a:avLst/>
           </a:prstGeom>
@@ -3792,39 +3920,193 @@
           <a:bodyPr/>
           <a:lstStyle/>
           <a:p>
-            <a:pPr/>
-            <a:r>
-              <a:t>Unsere Facebookgruppe (</a:t>
+            <a:pPr>
+              <a:lnSpc>
+                <a:spcPct val="80000"/>
+              </a:lnSpc>
+              <a:defRPr sz="3200"/>
+            </a:pPr>
+            <a:r>
+              <a:t>Unsere Facebookgruppe</a:t>
+            </a:r>
+            <a:r>
+              <a:t> </a:t>
+            </a:r>
+            <a:br/>
+            <a:r>
+              <a:t>Diem25 Schweiz/Suisse/Svizzera/Svizra/Switzerland</a:t>
+            </a:r>
+            <a:br>
+              <a:rPr>
+                <a:solidFill>
+                  <a:srgbClr val="FF0000"/>
+                </a:solidFill>
+              </a:rPr>
+            </a:br>
+            <a:r>
+              <a:t>(</a:t>
             </a:r>
             <a:r>
               <a:rPr u="sng">
+                <a:solidFill>
+                  <a:srgbClr val="0000FF"/>
+                </a:solidFill>
+                <a:uFill>
+                  <a:solidFill>
+                    <a:srgbClr val="0000FF"/>
+                  </a:solidFill>
+                </a:uFill>
                 <a:hlinkClick r:id="rId3" invalidUrl="" action="" tgtFrame="" tooltip="" history="1" highlightClick="0" endSnd="0"/>
               </a:rPr>
-              <a:t>https://www.facebook.com/groups/1748339115414536/</a:t>
+              <a:t>https</a:t>
+            </a:r>
+            <a:r>
+              <a:rPr u="sng">
+                <a:solidFill>
+                  <a:srgbClr val="0000FF"/>
+                </a:solidFill>
+                <a:uFill>
+                  <a:solidFill>
+                    <a:srgbClr val="0000FF"/>
+                  </a:solidFill>
+                </a:uFill>
+                <a:hlinkClick r:id="rId3" invalidUrl="" action="" tgtFrame="" tooltip="" history="1" highlightClick="0" endSnd="0"/>
+              </a:rPr>
+              <a:t>://www.facebook.com/groups/1748339115414536/</a:t>
             </a:r>
             <a:r>
               <a:t>)</a:t>
             </a:r>
           </a:p>
           <a:p>
-            <a:pPr/>
+            <a:pPr>
+              <a:lnSpc>
+                <a:spcPct val="80000"/>
+              </a:lnSpc>
+              <a:defRPr sz="3200"/>
+            </a:pPr>
             <a:r>
               <a:t>Mitglied werden unter </a:t>
             </a:r>
             <a:r>
               <a:rPr u="sng">
+                <a:solidFill>
+                  <a:srgbClr val="0000FF"/>
+                </a:solidFill>
+                <a:uFill>
+                  <a:solidFill>
+                    <a:srgbClr val="0000FF"/>
+                  </a:solidFill>
+                </a:uFill>
                 <a:hlinkClick r:id="rId4" invalidUrl="" action="" tgtFrame="" tooltip="" history="1" highlightClick="0" endSnd="0"/>
               </a:rPr>
-              <a:t>www.diem25.Org</a:t>
-            </a:r>
-          </a:p>
-          <a:p>
-            <a:pPr/>
+              <a:t>www.diem25.</a:t>
+            </a:r>
+            <a:r>
+              <a:rPr u="sng">
+                <a:solidFill>
+                  <a:srgbClr val="0000FF"/>
+                </a:solidFill>
+                <a:uFill>
+                  <a:solidFill>
+                    <a:srgbClr val="0000FF"/>
+                  </a:solidFill>
+                </a:uFill>
+                <a:hlinkClick r:id="rId4" invalidUrl="" action="" tgtFrame="" tooltip="" history="1" highlightClick="0" endSnd="0"/>
+              </a:rPr>
+              <a:t>o</a:t>
+            </a:r>
+            <a:r>
+              <a:rPr u="sng">
+                <a:solidFill>
+                  <a:srgbClr val="0000FF"/>
+                </a:solidFill>
+                <a:uFill>
+                  <a:solidFill>
+                    <a:srgbClr val="0000FF"/>
+                  </a:solidFill>
+                </a:uFill>
+                <a:hlinkClick r:id="rId4" invalidUrl="" action="" tgtFrame="" tooltip="" history="1" highlightClick="0" endSnd="0"/>
+              </a:rPr>
+              <a:t>rg</a:t>
+            </a:r>
+            <a:endParaRPr u="sng"/>
+          </a:p>
+          <a:p>
+            <a:pPr>
+              <a:lnSpc>
+                <a:spcPct val="80000"/>
+              </a:lnSpc>
+              <a:defRPr sz="3200"/>
+            </a:pPr>
+            <a:r>
+              <a:t>Unser DiEM25 Forum: </a:t>
+            </a:r>
+            <a:br/>
+            <a:r>
+              <a:t>Startseite </a:t>
+            </a:r>
+            <a:r>
+              <a:rPr>
+                <a:latin typeface="Wingdings"/>
+                <a:ea typeface="Wingdings"/>
+                <a:cs typeface="Wingdings"/>
+                <a:sym typeface="Wingdings"/>
+              </a:rPr>
+              <a:t></a:t>
+            </a:r>
+            <a:r>
+              <a:t> Foren-Übersicht </a:t>
+            </a:r>
+            <a:r>
+              <a:rPr>
+                <a:latin typeface="Wingdings"/>
+                <a:ea typeface="Wingdings"/>
+                <a:cs typeface="Wingdings"/>
+                <a:sym typeface="Wingdings"/>
+              </a:rPr>
+              <a:t></a:t>
+            </a:r>
+            <a:r>
+              <a:t> MEET LOCAL MEMBERS </a:t>
+            </a:r>
+            <a:r>
+              <a:rPr>
+                <a:latin typeface="Wingdings"/>
+                <a:ea typeface="Wingdings"/>
+                <a:cs typeface="Wingdings"/>
+                <a:sym typeface="Wingdings"/>
+              </a:rPr>
+              <a:t></a:t>
+            </a:r>
+            <a:r>
+              <a:t> Switzerland</a:t>
+            </a:r>
+            <a:br/>
+            <a:r>
+              <a:t>(https://www.diem25.org/forum/viewforum.php?f=171&amp;sid=00e192925a9abfc396c81aa915c3011b)</a:t>
+            </a:r>
+          </a:p>
+          <a:p>
+            <a:pPr>
+              <a:lnSpc>
+                <a:spcPct val="80000"/>
+              </a:lnSpc>
+              <a:defRPr sz="3200"/>
+            </a:pPr>
             <a:r>
               <a:t>Petition Transparenz in Der EU (</a:t>
             </a:r>
             <a:r>
               <a:rPr u="sng">
+                <a:solidFill>
+                  <a:srgbClr val="0000FF"/>
+                </a:solidFill>
+                <a:uFill>
+                  <a:solidFill>
+                    <a:srgbClr val="0000FF"/>
+                  </a:solidFill>
+                </a:uFill>
                 <a:hlinkClick r:id="rId5" invalidUrl="" action="" tgtFrame="" tooltip="" history="1" highlightClick="0" endSnd="0"/>
               </a:rPr>
               <a:t>https://you.wemove.eu/campaigns/transparency</a:t>
@@ -3894,7 +4176,7 @@
           <p:cNvPr id="116" name="Shape 116"/>
           <p:cNvSpPr/>
           <p:nvPr>
-            <p:ph type="body" idx="13"/>
+            <p:ph type="body" sz="quarter" idx="1"/>
           </p:nvPr>
         </p:nvSpPr>
         <p:spPr>
@@ -3933,7 +4215,7 @@
           <p:cNvPr id="117" name="Shape 117"/>
           <p:cNvSpPr/>
           <p:nvPr>
-            <p:ph type="body" idx="14"/>
+            <p:ph type="body" idx="13"/>
           </p:nvPr>
         </p:nvSpPr>
         <p:spPr>
@@ -3944,24 +4226,62 @@
           <a:prstGeom prst="rect">
             <a:avLst/>
           </a:prstGeom>
+          <a:extLst>
+            <a:ext uri="{C572A759-6A51-4108-AA02-DFA0A04FC94B}">
+              <ma14:wrappingTextBoxFlag xmlns:ma14="http://schemas.microsoft.com/office/mac/drawingml/2011/main" val="1"/>
+            </a:ext>
+          </a:extLst>
         </p:spPr>
         <p:txBody>
           <a:bodyPr/>
           <a:lstStyle/>
           <a:p>
-            <a:pPr/>
+            <a:pPr marL="0" indent="0" algn="ctr">
+              <a:spcBef>
+                <a:spcPts val="0"/>
+              </a:spcBef>
+              <a:buSzTx/>
+              <a:buNone/>
+              <a:defRPr>
+                <a:solidFill>
+                  <a:srgbClr val="FFFFFF"/>
+                </a:solidFill>
+              </a:defRPr>
+            </a:pPr>
             <a:r>
               <a:t>“Let’s shake Europe gently,</a:t>
             </a:r>
           </a:p>
           <a:p>
-            <a:pPr/>
+            <a:pPr marL="0" indent="0" algn="ctr">
+              <a:spcBef>
+                <a:spcPts val="0"/>
+              </a:spcBef>
+              <a:buSzTx/>
+              <a:buNone/>
+              <a:defRPr>
+                <a:solidFill>
+                  <a:srgbClr val="FFFFFF"/>
+                </a:solidFill>
+              </a:defRPr>
+            </a:pPr>
             <a:r>
               <a:t>compassionately,</a:t>
             </a:r>
           </a:p>
           <a:p>
-            <a:pPr/>
+            <a:pPr marL="0" indent="0" algn="ctr">
+              <a:spcBef>
+                <a:spcPts val="0"/>
+              </a:spcBef>
+              <a:buSzTx/>
+              <a:buNone/>
+              <a:defRPr>
+                <a:solidFill>
+                  <a:srgbClr val="FFFFFF"/>
+                </a:solidFill>
+              </a:defRPr>
+            </a:pPr>
             <a:r>
               <a:t>but firmly” </a:t>
             </a:r>
@@ -4004,8 +4324,8 @@
         </p:nvSpPr>
         <p:spPr>
           <a:xfrm>
-            <a:off x="635000" y="887561"/>
-            <a:ext cx="7777666" cy="2159001"/>
+            <a:off x="634999" y="887561"/>
+            <a:ext cx="7777668" cy="2159002"/>
           </a:xfrm>
           <a:prstGeom prst="rect">
             <a:avLst/>
@@ -4039,44 +4359,79 @@
           <a:bodyPr/>
           <a:lstStyle/>
           <a:p>
-            <a:pPr marL="431165" indent="-431165" defTabSz="566674">
+            <a:pPr marL="431165" indent="-431165" defTabSz="566673">
+              <a:lnSpc>
+                <a:spcPct val="90000"/>
+              </a:lnSpc>
               <a:spcBef>
                 <a:spcPts val="4000"/>
               </a:spcBef>
-              <a:defRPr sz="3686"/>
+              <a:defRPr sz="3600"/>
             </a:pPr>
             <a:r>
               <a:t>Eine Bürgerbewegung zur Demokratisierung der EU</a:t>
             </a:r>
-          </a:p>
-          <a:p>
-            <a:pPr marL="431165" indent="-431165" defTabSz="566674">
+            <a:r>
+              <a:rPr>
+                <a:solidFill>
+                  <a:srgbClr val="FF0000"/>
+                </a:solidFill>
+              </a:rPr>
+              <a:t> </a:t>
+            </a:r>
+            <a:r>
+              <a:t>im Speziellen und Europa im Allgemeinen</a:t>
+            </a:r>
+          </a:p>
+          <a:p>
+            <a:pPr marL="431165" indent="-431165" defTabSz="566673">
+              <a:lnSpc>
+                <a:spcPct val="90000"/>
+              </a:lnSpc>
               <a:spcBef>
                 <a:spcPts val="4000"/>
               </a:spcBef>
-              <a:defRPr sz="3686"/>
+              <a:defRPr sz="3600"/>
             </a:pPr>
             <a:r>
-              <a:t>Ziel ist eine EU mit Demokratischer Verfassung bis 2025</a:t>
-            </a:r>
-          </a:p>
-          <a:p>
-            <a:pPr marL="431165" indent="-431165" defTabSz="566674">
+              <a:t>Ziel ist ein E</a:t>
+            </a:r>
+            <a:r>
+              <a:t>uropa</a:t>
+            </a:r>
+            <a:r>
+              <a:t> mit Demokratischer Verfassung bis 2025</a:t>
+            </a:r>
+            <a:r>
+              <a:t> </a:t>
+            </a:r>
+            <a:r>
+              <a:t>(ähnlich wie die USA, d.h. ein Vereinigte Staaten von Europa)</a:t>
+            </a:r>
+          </a:p>
+          <a:p>
+            <a:pPr marL="431165" indent="-431165" defTabSz="566673">
+              <a:lnSpc>
+                <a:spcPct val="90000"/>
+              </a:lnSpc>
               <a:spcBef>
                 <a:spcPts val="4000"/>
               </a:spcBef>
-              <a:defRPr sz="3686"/>
+              <a:defRPr sz="3600"/>
             </a:pPr>
             <a:r>
-              <a:t>Diem25 wurde auf Initiative von Yanis Varoufakis, Srecko Horvat und Lorenzo Marsili gegründet</a:t>
-            </a:r>
-          </a:p>
-          <a:p>
-            <a:pPr marL="431165" indent="-431165" defTabSz="566674">
+              <a:t>DiEM25 wurde auf Initiative von Yanis Varoufakis, Srecko Horvat und Lorenzo Marsili gegründet</a:t>
+            </a:r>
+          </a:p>
+          <a:p>
+            <a:pPr marL="431165" indent="-431165" defTabSz="566673">
+              <a:lnSpc>
+                <a:spcPct val="90000"/>
+              </a:lnSpc>
               <a:spcBef>
                 <a:spcPts val="4000"/>
               </a:spcBef>
-              <a:defRPr sz="3686"/>
+              <a:defRPr sz="3600"/>
             </a:pPr>
             <a:r>
               <a:t>Dies geschah auch als Reaktion auf die Niederschlagung des “Athener Frühlings”</a:t>
@@ -4120,8 +4475,8 @@
         </p:nvSpPr>
         <p:spPr>
           <a:xfrm>
-            <a:off x="635000" y="887561"/>
-            <a:ext cx="7777295" cy="2159001"/>
+            <a:off x="634999" y="887561"/>
+            <a:ext cx="7777297" cy="2159002"/>
           </a:xfrm>
           <a:prstGeom prst="rect">
             <a:avLst/>
@@ -4148,8 +4503,8 @@
         </p:nvSpPr>
         <p:spPr>
           <a:xfrm>
-            <a:off x="952500" y="2767755"/>
-            <a:ext cx="11099801" cy="6286501"/>
+            <a:off x="952499" y="2767755"/>
+            <a:ext cx="11099803" cy="6286502"/>
           </a:xfrm>
           <a:prstGeom prst="rect">
             <a:avLst/>
@@ -4159,16 +4514,19 @@
           <a:bodyPr/>
           <a:lstStyle/>
           <a:p>
-            <a:pPr marL="0" indent="0" defTabSz="344677">
+            <a:pPr marL="0" indent="0" defTabSz="344676">
+              <a:lnSpc>
+                <a:spcPct val="90000"/>
+              </a:lnSpc>
               <a:spcBef>
                 <a:spcPts val="2400"/>
               </a:spcBef>
               <a:buSzTx/>
               <a:buNone/>
-              <a:defRPr sz="2241">
-                <a:latin typeface="Helvetica"/>
-                <a:ea typeface="Helvetica"/>
-                <a:cs typeface="Helvetica"/>
+              <a:defRPr sz="2200">
+                <a:latin typeface="+mn-lt"/>
+                <a:ea typeface="+mn-ea"/>
+                <a:cs typeface="+mn-cs"/>
                 <a:sym typeface="Helvetica"/>
               </a:defRPr>
             </a:pPr>
@@ -4177,53 +4535,65 @@
             </a:r>
           </a:p>
           <a:p>
-            <a:pPr lvl="1" marL="524509" indent="-262254" defTabSz="344677">
+            <a:pPr lvl="1" marL="524509" indent="-262254" defTabSz="344676">
+              <a:lnSpc>
+                <a:spcPct val="90000"/>
+              </a:lnSpc>
               <a:spcBef>
                 <a:spcPts val="2400"/>
               </a:spcBef>
-              <a:defRPr sz="2241"/>
+              <a:defRPr sz="2200"/>
             </a:pPr>
             <a:r>
               <a:t>Volle Transparenz bei der Entscheidungsfindung in der EU</a:t>
             </a:r>
           </a:p>
           <a:p>
-            <a:pPr lvl="2" marL="1168907" indent="-389635" defTabSz="344677">
+            <a:pPr lvl="2" marL="1168907" indent="-389635" defTabSz="344676">
+              <a:lnSpc>
+                <a:spcPct val="90000"/>
+              </a:lnSpc>
               <a:spcBef>
                 <a:spcPts val="2400"/>
               </a:spcBef>
               <a:buSzPct val="100000"/>
               <a:buAutoNum type="arabicPeriod" startAt="1"/>
-              <a:defRPr sz="2241"/>
+              <a:defRPr sz="2200"/>
             </a:pPr>
             <a:r>
               <a:t>Liveübertragung von Sitzungen aller EU-Gremien </a:t>
             </a:r>
           </a:p>
           <a:p>
-            <a:pPr lvl="2" marL="1168907" indent="-389635" defTabSz="344677">
+            <a:pPr lvl="2" marL="1168907" indent="-389635" defTabSz="344676">
+              <a:lnSpc>
+                <a:spcPct val="90000"/>
+              </a:lnSpc>
               <a:spcBef>
                 <a:spcPts val="2400"/>
               </a:spcBef>
               <a:buSzPct val="100000"/>
               <a:buAutoNum type="arabicPeriod" startAt="1"/>
-              <a:defRPr sz="2241"/>
+              <a:defRPr sz="2200"/>
             </a:pPr>
             <a:r>
               <a:t>Nachträgliche Veröffentlichungen der Sitzungsprotokolle der EZB</a:t>
             </a:r>
           </a:p>
           <a:p>
-            <a:pPr marL="0" indent="0" defTabSz="344677">
+            <a:pPr marL="0" indent="0" defTabSz="344676">
+              <a:lnSpc>
+                <a:spcPct val="90000"/>
+              </a:lnSpc>
               <a:spcBef>
                 <a:spcPts val="2400"/>
               </a:spcBef>
               <a:buSzTx/>
               <a:buNone/>
-              <a:defRPr sz="2241">
-                <a:latin typeface="Helvetica"/>
-                <a:ea typeface="Helvetica"/>
-                <a:cs typeface="Helvetica"/>
+              <a:defRPr sz="2200">
+                <a:latin typeface="+mn-lt"/>
+                <a:ea typeface="+mn-ea"/>
+                <a:cs typeface="+mn-cs"/>
                 <a:sym typeface="Helvetica"/>
               </a:defRPr>
             </a:pPr>
@@ -4232,38 +4602,47 @@
             </a:r>
           </a:p>
           <a:p>
-            <a:pPr lvl="1" marL="524509" indent="-262254" defTabSz="344677">
+            <a:pPr lvl="1" marL="524509" indent="-262254" defTabSz="344676">
+              <a:lnSpc>
+                <a:spcPct val="90000"/>
+              </a:lnSpc>
               <a:spcBef>
                 <a:spcPts val="2400"/>
               </a:spcBef>
-              <a:defRPr sz="2241"/>
+              <a:defRPr sz="2200"/>
             </a:pPr>
             <a:r>
               <a:t>Aktuelle Wirtschaftskrise mit den bestehenden Institutionen und im Rahmen der bestehenden EU-Verträge angehen</a:t>
             </a:r>
           </a:p>
           <a:p>
-            <a:pPr lvl="1" marL="524509" indent="-262254" defTabSz="344677">
+            <a:pPr lvl="1" marL="524509" indent="-262254" defTabSz="344676">
+              <a:lnSpc>
+                <a:spcPct val="90000"/>
+              </a:lnSpc>
               <a:spcBef>
                 <a:spcPts val="2400"/>
               </a:spcBef>
-              <a:defRPr sz="2241"/>
+              <a:defRPr sz="2200"/>
             </a:pPr>
             <a:r>
               <a:t>Wahl einer Verfassungsgebenden Versammlung</a:t>
             </a:r>
           </a:p>
           <a:p>
-            <a:pPr marL="0" indent="0" defTabSz="344677">
+            <a:pPr marL="0" indent="0" defTabSz="344676">
+              <a:lnSpc>
+                <a:spcPct val="90000"/>
+              </a:lnSpc>
               <a:spcBef>
                 <a:spcPts val="2400"/>
               </a:spcBef>
               <a:buSzTx/>
               <a:buNone/>
-              <a:defRPr sz="2241">
-                <a:latin typeface="Helvetica"/>
-                <a:ea typeface="Helvetica"/>
-                <a:cs typeface="Helvetica"/>
+              <a:defRPr sz="2200">
+                <a:latin typeface="+mn-lt"/>
+                <a:ea typeface="+mn-ea"/>
+                <a:cs typeface="+mn-cs"/>
                 <a:sym typeface="Helvetica"/>
               </a:defRPr>
             </a:pPr>
@@ -4272,14 +4651,23 @@
             </a:r>
           </a:p>
           <a:p>
-            <a:pPr lvl="1" marL="524509" indent="-262254" defTabSz="344677">
+            <a:pPr lvl="1" marL="524509" indent="-262254" defTabSz="344676">
+              <a:lnSpc>
+                <a:spcPct val="90000"/>
+              </a:lnSpc>
               <a:spcBef>
                 <a:spcPts val="2400"/>
               </a:spcBef>
-              <a:defRPr sz="2241"/>
+              <a:defRPr sz="2200"/>
             </a:pPr>
             <a:r>
-              <a:t>Demokratische, Transparente, Wirtschaftlich prosperierende EU Aufgrund der Vorschläge der Verfassungsgebenden Versammlung</a:t>
+              <a:t>Demokratische, Transparentes </a:t>
+            </a:r>
+            <a:r>
+              <a:t>Europa</a:t>
+            </a:r>
+            <a:r>
+              <a:t> Aufgrund der Vorschläge der Verfassungsgebenden Versammlung</a:t>
             </a:r>
           </a:p>
         </p:txBody>
@@ -4321,7 +4709,7 @@
         <p:spPr>
           <a:xfrm>
             <a:off x="635000" y="887561"/>
-            <a:ext cx="7743581" cy="2159001"/>
+            <a:ext cx="7743581" cy="2159002"/>
           </a:xfrm>
           <a:prstGeom prst="rect">
             <a:avLst/>
@@ -4361,10 +4749,10 @@
               </a:spcBef>
               <a:buSzTx/>
               <a:buNone/>
-              <a:defRPr sz="2850">
-                <a:latin typeface="Helvetica"/>
-                <a:ea typeface="Helvetica"/>
-                <a:cs typeface="Helvetica"/>
+              <a:defRPr sz="2800">
+                <a:latin typeface="+mn-lt"/>
+                <a:ea typeface="+mn-ea"/>
+                <a:cs typeface="+mn-cs"/>
                 <a:sym typeface="Helvetica"/>
               </a:defRPr>
             </a:pPr>
@@ -4377,7 +4765,7 @@
               <a:spcBef>
                 <a:spcPts val="3100"/>
               </a:spcBef>
-              <a:defRPr sz="2850"/>
+              <a:defRPr sz="2800"/>
             </a:pPr>
             <a:r>
               <a:t>Schwindende Macht der Nationalstaaten</a:t>
@@ -4388,7 +4776,7 @@
               <a:spcBef>
                 <a:spcPts val="3100"/>
               </a:spcBef>
-              <a:defRPr sz="2850"/>
+              <a:defRPr sz="2800"/>
             </a:pPr>
             <a:r>
               <a:t>Steigender Einfluss von multinationalen Konzernen</a:t>
@@ -4399,7 +4787,7 @@
               <a:spcBef>
                 <a:spcPts val="3100"/>
               </a:spcBef>
-              <a:defRPr sz="2850"/>
+              <a:defRPr sz="2800"/>
             </a:pPr>
             <a:r>
               <a:t>Steigender Einfluss von undemokratischen Institutionen (EU, TTIP, etc..)</a:t>
@@ -4410,7 +4798,7 @@
               <a:spcBef>
                 <a:spcPts val="3100"/>
               </a:spcBef>
-              <a:defRPr sz="2850"/>
+              <a:defRPr sz="2800"/>
             </a:pPr>
             <a:r>
               <a:t>Zunehmend Desinteresse/Ablehnung an politischen Prozessen</a:t>
@@ -4421,7 +4809,7 @@
               <a:spcBef>
                 <a:spcPts val="3100"/>
               </a:spcBef>
-              <a:defRPr sz="2850"/>
+              <a:defRPr sz="2800"/>
             </a:pPr>
             <a:r>
               <a:t>Erstarken rechtsradikaler Bewegungen</a:t>
@@ -4432,7 +4820,7 @@
               <a:spcBef>
                 <a:spcPts val="3100"/>
               </a:spcBef>
-              <a:defRPr sz="2850"/>
+              <a:defRPr sz="2800"/>
             </a:pPr>
             <a:r>
               <a:t>Wirtschaftlich schwaches Europa</a:t>
@@ -4477,7 +4865,7 @@
         <p:spPr>
           <a:xfrm>
             <a:off x="635000" y="887561"/>
-            <a:ext cx="7743581" cy="2159001"/>
+            <a:ext cx="7743581" cy="2159002"/>
           </a:xfrm>
           <a:prstGeom prst="rect">
             <a:avLst/>
@@ -4504,8 +4892,8 @@
         </p:nvSpPr>
         <p:spPr>
           <a:xfrm>
-            <a:off x="952500" y="2330207"/>
-            <a:ext cx="11099800" cy="6286501"/>
+            <a:off x="952500" y="2330206"/>
+            <a:ext cx="11099800" cy="6286503"/>
           </a:xfrm>
           <a:prstGeom prst="rect">
             <a:avLst/>
@@ -4515,16 +4903,16 @@
           <a:bodyPr/>
           <a:lstStyle/>
           <a:p>
-            <a:pPr marL="0" indent="0" defTabSz="455675">
+            <a:pPr marL="0" indent="0" defTabSz="455674">
               <a:spcBef>
                 <a:spcPts val="3200"/>
               </a:spcBef>
               <a:buSzTx/>
               <a:buNone/>
-              <a:defRPr sz="2964">
-                <a:latin typeface="Helvetica"/>
-                <a:ea typeface="Helvetica"/>
-                <a:cs typeface="Helvetica"/>
+              <a:defRPr sz="2900">
+                <a:latin typeface="+mn-lt"/>
+                <a:ea typeface="+mn-ea"/>
+                <a:cs typeface="+mn-cs"/>
                 <a:sym typeface="Helvetica"/>
               </a:defRPr>
             </a:pPr>
@@ -4533,72 +4921,78 @@
             </a:r>
           </a:p>
           <a:p>
-            <a:pPr lvl="1" marL="693419" indent="-346709" defTabSz="455675">
+            <a:pPr lvl="1" marL="693419" indent="-346708" defTabSz="455674">
               <a:spcBef>
                 <a:spcPts val="3200"/>
               </a:spcBef>
-              <a:defRPr sz="2964"/>
+              <a:defRPr sz="2900"/>
             </a:pPr>
             <a:r>
               <a:t>Leben in einer zunehmend autoritären EU</a:t>
             </a:r>
           </a:p>
           <a:p>
-            <a:pPr lvl="2" marL="0" indent="356615" defTabSz="455675">
+            <a:pPr lvl="2" marL="0" indent="356615" defTabSz="455674">
               <a:spcBef>
                 <a:spcPts val="3200"/>
               </a:spcBef>
               <a:buSzTx/>
               <a:buNone/>
-              <a:defRPr sz="2964"/>
+              <a:defRPr sz="2900"/>
             </a:pPr>
             <a:r>
               <a:t>—&gt; Negative Entwicklung geht weiter</a:t>
             </a:r>
           </a:p>
           <a:p>
-            <a:pPr lvl="1" marL="693419" indent="-346709" defTabSz="455675">
+            <a:pPr lvl="1" marL="693419" indent="-346708" defTabSz="455674">
               <a:spcBef>
                 <a:spcPts val="3200"/>
               </a:spcBef>
-              <a:defRPr sz="2964"/>
+              <a:defRPr sz="2900"/>
             </a:pPr>
             <a:r>
               <a:t>Schrittweiser zerfall der EU. </a:t>
             </a:r>
           </a:p>
           <a:p>
-            <a:pPr lvl="2" marL="0" indent="356615" defTabSz="455675">
+            <a:pPr lvl="2" marL="0" indent="356615" defTabSz="455674">
               <a:spcBef>
                 <a:spcPts val="3200"/>
               </a:spcBef>
               <a:buSzTx/>
               <a:buNone/>
-              <a:defRPr sz="2964"/>
+              <a:defRPr sz="2900"/>
             </a:pPr>
             <a:r>
               <a:t>—&gt; Negative Entwicklung geht weiter</a:t>
             </a:r>
           </a:p>
           <a:p>
-            <a:pPr lvl="1" marL="693419" indent="-346709" defTabSz="455675">
+            <a:pPr lvl="1" marL="693419" indent="-346708" defTabSz="455674">
               <a:spcBef>
                 <a:spcPts val="3200"/>
               </a:spcBef>
-              <a:defRPr sz="2964"/>
+              <a:defRPr sz="2900"/>
             </a:pPr>
             <a:r>
-              <a:t>Demokratisierung der EU. Rückgewinn der Deutungshoheit der Politik über die Wirtschaft.</a:t>
-            </a:r>
-          </a:p>
-          <a:p>
-            <a:pPr lvl="2" marL="0" indent="356615" defTabSz="455675">
+              <a:t>Demokratisierung von </a:t>
+            </a:r>
+            <a:r>
+              <a:t>Europa</a:t>
+            </a:r>
+            <a:r>
+              <a:t>. Rückgewinn der Deutungshoheit der Politik über die Wirtschaft.</a:t>
+            </a:r>
+          </a:p>
+          <a:p>
+            <a:pPr lvl="2" marL="0" indent="356615" defTabSz="455674">
               <a:spcBef>
                 <a:spcPts val="3200"/>
               </a:spcBef>
               <a:buSzTx/>
               <a:buNone/>
-              <a:defRPr sz="2964"/>
+              <a:defRPr sz="2900"/>
             </a:pPr>
             <a:r>
               <a:t>—&gt; Hoffentlich eine Verbesserung der Lage</a:t>
@@ -4641,6 +5035,10 @@
           </p:nvPr>
         </p:nvSpPr>
         <p:spPr>
+          <a:xfrm>
+            <a:off x="635000" y="887561"/>
+            <a:ext cx="11099800" cy="2159002"/>
+          </a:xfrm>
           <a:prstGeom prst="rect">
             <a:avLst/>
           </a:prstGeom>
@@ -4649,9 +5047,15 @@
           <a:bodyPr/>
           <a:lstStyle/>
           <a:p>
-            <a:pPr lvl="1"/>
-            <a:r>
-              <a:t>Warum Diem25?</a:t>
+            <a:pPr lvl="1" indent="228600"/>
+            <a:r>
+              <a:t>Warum </a:t>
+            </a:r>
+            <a:r>
+              <a:t>DiEM</a:t>
+            </a:r>
+            <a:r>
+              <a:t>25?</a:t>
             </a:r>
           </a:p>
         </p:txBody>
@@ -4675,7 +5079,19 @@
           <a:p>
             <a:pPr/>
             <a:r>
-              <a:t>Warum wir glauben, dass Diem25 eine Change hat</a:t>
+              <a:t>Warum wir glauben, dass </a:t>
+            </a:r>
+            <a:r>
+              <a:t>DiEM</a:t>
+            </a:r>
+            <a:r>
+              <a:t>25 eine Chan</a:t>
+            </a:r>
+            <a:r>
+              <a:t>c</a:t>
+            </a:r>
+            <a:r>
+              <a:t>e hat</a:t>
             </a:r>
           </a:p>
         </p:txBody>
@@ -4715,6 +5131,10 @@
           </p:nvPr>
         </p:nvSpPr>
         <p:spPr>
+          <a:xfrm>
+            <a:off x="635000" y="887561"/>
+            <a:ext cx="11099800" cy="2159002"/>
+          </a:xfrm>
           <a:prstGeom prst="rect">
             <a:avLst/>
           </a:prstGeom>
@@ -4732,7 +5152,7 @@
       </p:sp>
       <p:pic>
         <p:nvPicPr>
-          <p:cNvPr id="86" name="pasted-image.png"/>
+          <p:cNvPr id="86" name="image4.png"/>
           <p:cNvPicPr>
             <a:picLocks noChangeAspect="1"/>
           </p:cNvPicPr>
@@ -4748,8 +5168,8 @@
         </p:blipFill>
         <p:spPr>
           <a:xfrm>
-            <a:off x="5931395" y="2252556"/>
-            <a:ext cx="6532749" cy="6797888"/>
+            <a:off x="5931394" y="2252555"/>
+            <a:ext cx="6532751" cy="6797890"/>
           </a:xfrm>
           <a:prstGeom prst="rect">
             <a:avLst/>
@@ -4767,7 +5187,7 @@
         </p:nvSpPr>
         <p:spPr>
           <a:xfrm>
-            <a:off x="635000" y="2806700"/>
+            <a:off x="635000" y="2806699"/>
             <a:ext cx="4674312" cy="4140201"/>
           </a:xfrm>
           <a:prstGeom prst="rect">
@@ -4794,11 +5214,7 @@
               </a:spcBef>
               <a:buSzPct val="75000"/>
               <a:buChar char="•"/>
-              <a:defRPr sz="3800">
-                <a:solidFill>
-                  <a:srgbClr val="000000"/>
-                </a:solidFill>
-              </a:defRPr>
+              <a:defRPr sz="3800"/>
             </a:pPr>
             <a:r>
               <a:t>Wachsende Bewegung (aktuell mehr als 17’000 Mitglieder)</a:t>
@@ -4811,11 +5227,7 @@
               </a:spcBef>
               <a:buSzPct val="75000"/>
               <a:buChar char="•"/>
-              <a:defRPr sz="3800">
-                <a:solidFill>
-                  <a:srgbClr val="000000"/>
-                </a:solidFill>
-              </a:defRPr>
+              <a:defRPr sz="3800"/>
             </a:pPr>
             <a:r>
               <a:t>Von Grund auf Europäisch</a:t>
@@ -4858,6 +5270,10 @@
           </p:nvPr>
         </p:nvSpPr>
         <p:spPr>
+          <a:xfrm>
+            <a:off x="635000" y="887561"/>
+            <a:ext cx="11099800" cy="2159002"/>
+          </a:xfrm>
           <a:prstGeom prst="rect">
             <a:avLst/>
           </a:prstGeom>
@@ -4875,7 +5291,7 @@
       </p:sp>
       <p:pic>
         <p:nvPicPr>
-          <p:cNvPr id="92" name="Franco-Berardi-286x325.jpg"/>
+          <p:cNvPr id="92" name="image5.jpeg"/>
           <p:cNvPicPr>
             <a:picLocks noChangeAspect="1"/>
           </p:cNvPicPr>
@@ -4891,8 +5307,8 @@
         </p:blipFill>
         <p:spPr>
           <a:xfrm>
-            <a:off x="5269539" y="3013957"/>
-            <a:ext cx="2463801" cy="2799774"/>
+            <a:off x="5269538" y="3013956"/>
+            <a:ext cx="2463802" cy="2799775"/>
           </a:xfrm>
           <a:prstGeom prst="rect">
             <a:avLst/>
@@ -4904,7 +5320,7 @@
       </p:pic>
       <p:pic>
         <p:nvPicPr>
-          <p:cNvPr id="93" name="Noam-Chomsky.jpg"/>
+          <p:cNvPr id="93" name="image6.jpeg"/>
           <p:cNvPicPr>
             <a:picLocks noChangeAspect="1"/>
           </p:cNvPicPr>
@@ -4920,8 +5336,8 @@
         </p:blipFill>
         <p:spPr>
           <a:xfrm>
-            <a:off x="7912944" y="3013957"/>
-            <a:ext cx="2463801" cy="2799774"/>
+            <a:off x="7912944" y="3013956"/>
+            <a:ext cx="2463802" cy="2799775"/>
           </a:xfrm>
           <a:prstGeom prst="rect">
             <a:avLst/>
@@ -4933,7 +5349,7 @@
       </p:pic>
       <p:pic>
         <p:nvPicPr>
-          <p:cNvPr id="94" name="Slavoj-Zizek-286x325.jpg"/>
+          <p:cNvPr id="94" name="image7.jpeg"/>
           <p:cNvPicPr>
             <a:picLocks noChangeAspect="1"/>
           </p:cNvPicPr>
@@ -4949,8 +5365,8 @@
         </p:blipFill>
         <p:spPr>
           <a:xfrm>
-            <a:off x="2626133" y="3013957"/>
-            <a:ext cx="2463801" cy="2799774"/>
+            <a:off x="2626132" y="3013956"/>
+            <a:ext cx="2463802" cy="2799775"/>
           </a:xfrm>
           <a:prstGeom prst="rect">
             <a:avLst/>
@@ -4962,7 +5378,7 @@
       </p:pic>
       <p:pic>
         <p:nvPicPr>
-          <p:cNvPr id="95" name="Yanis-Varoufakis.jpg"/>
+          <p:cNvPr id="95" name="image8.jpeg"/>
           <p:cNvPicPr>
             <a:picLocks noChangeAspect="1"/>
           </p:cNvPicPr>
@@ -4978,8 +5394,8 @@
         </p:blipFill>
         <p:spPr>
           <a:xfrm>
-            <a:off x="-17272" y="3013957"/>
-            <a:ext cx="2463801" cy="2799774"/>
+            <a:off x="-17273" y="3013956"/>
+            <a:ext cx="2463802" cy="2799775"/>
           </a:xfrm>
           <a:prstGeom prst="rect">
             <a:avLst/>
@@ -4991,7 +5407,7 @@
       </p:pic>
       <p:pic>
         <p:nvPicPr>
-          <p:cNvPr id="96" name="Ken-Loach-286x325.jpg"/>
+          <p:cNvPr id="96" name="image9.jpeg"/>
           <p:cNvPicPr>
             <a:picLocks noChangeAspect="1"/>
           </p:cNvPicPr>
@@ -5007,8 +5423,8 @@
         </p:blipFill>
         <p:spPr>
           <a:xfrm>
-            <a:off x="10556351" y="3013957"/>
-            <a:ext cx="2463801" cy="2799774"/>
+            <a:off x="10556351" y="3013956"/>
+            <a:ext cx="2463801" cy="2799775"/>
           </a:xfrm>
           <a:prstGeom prst="rect">
             <a:avLst/>
@@ -5026,7 +5442,7 @@
         </p:nvSpPr>
         <p:spPr>
           <a:xfrm>
-            <a:off x="6070" y="5835649"/>
+            <a:off x="6070" y="5835648"/>
             <a:ext cx="2463801" cy="393701"/>
           </a:xfrm>
           <a:prstGeom prst="rect">
@@ -5047,11 +5463,7 @@
           </a:bodyPr>
           <a:lstStyle>
             <a:lvl1pPr algn="l">
-              <a:defRPr sz="1900">
-                <a:solidFill>
-                  <a:srgbClr val="000000"/>
-                </a:solidFill>
-              </a:defRPr>
+              <a:defRPr sz="1900"/>
             </a:lvl1pPr>
           </a:lstStyle>
           <a:p>
@@ -5070,7 +5482,127 @@
         </p:nvSpPr>
         <p:spPr>
           <a:xfrm>
-            <a:off x="2626133" y="5835649"/>
+            <a:off x="2626132" y="5835648"/>
+            <a:ext cx="2463802" cy="393701"/>
+          </a:xfrm>
+          <a:prstGeom prst="rect">
+            <a:avLst/>
+          </a:prstGeom>
+          <a:ln w="12700">
+            <a:miter lim="400000"/>
+          </a:ln>
+          <a:extLst>
+            <a:ext uri="{C572A759-6A51-4108-AA02-DFA0A04FC94B}">
+              <ma14:wrappingTextBoxFlag xmlns:ma14="http://schemas.microsoft.com/office/mac/drawingml/2011/main" val="1"/>
+            </a:ext>
+          </a:extLst>
+        </p:spPr>
+        <p:txBody>
+          <a:bodyPr lIns="50800" tIns="50800" rIns="50800" bIns="50800" anchor="ctr">
+            <a:spAutoFit/>
+          </a:bodyPr>
+          <a:lstStyle>
+            <a:lvl1pPr algn="l">
+              <a:defRPr sz="1900"/>
+            </a:lvl1pPr>
+          </a:lstStyle>
+          <a:p>
+            <a:pPr/>
+            <a:r>
+              <a:t>Slavoj Žižek</a:t>
+            </a:r>
+          </a:p>
+        </p:txBody>
+      </p:sp>
+      <p:sp>
+        <p:nvSpPr>
+          <p:cNvPr id="99" name="Shape 99"/>
+          <p:cNvSpPr/>
+          <p:nvPr/>
+        </p:nvSpPr>
+        <p:spPr>
+          <a:xfrm>
+            <a:off x="5270500" y="5835648"/>
+            <a:ext cx="2463800" cy="393701"/>
+          </a:xfrm>
+          <a:prstGeom prst="rect">
+            <a:avLst/>
+          </a:prstGeom>
+          <a:ln w="12700">
+            <a:miter lim="400000"/>
+          </a:ln>
+          <a:extLst>
+            <a:ext uri="{C572A759-6A51-4108-AA02-DFA0A04FC94B}">
+              <ma14:wrappingTextBoxFlag xmlns:ma14="http://schemas.microsoft.com/office/mac/drawingml/2011/main" val="1"/>
+            </a:ext>
+          </a:extLst>
+        </p:spPr>
+        <p:txBody>
+          <a:bodyPr lIns="50800" tIns="50800" rIns="50800" bIns="50800" anchor="ctr">
+            <a:spAutoFit/>
+          </a:bodyPr>
+          <a:lstStyle>
+            <a:lvl1pPr algn="l">
+              <a:defRPr sz="1900"/>
+            </a:lvl1pPr>
+          </a:lstStyle>
+          <a:p>
+            <a:pPr/>
+            <a:r>
+              <a:t>Franco “Bifo” Berardi</a:t>
+            </a:r>
+          </a:p>
+        </p:txBody>
+      </p:sp>
+      <p:sp>
+        <p:nvSpPr>
+          <p:cNvPr id="100" name="Shape 100"/>
+          <p:cNvSpPr/>
+          <p:nvPr/>
+        </p:nvSpPr>
+        <p:spPr>
+          <a:xfrm>
+            <a:off x="7912944" y="5835648"/>
+            <a:ext cx="2463802" cy="393701"/>
+          </a:xfrm>
+          <a:prstGeom prst="rect">
+            <a:avLst/>
+          </a:prstGeom>
+          <a:ln w="12700">
+            <a:miter lim="400000"/>
+          </a:ln>
+          <a:extLst>
+            <a:ext uri="{C572A759-6A51-4108-AA02-DFA0A04FC94B}">
+              <ma14:wrappingTextBoxFlag xmlns:ma14="http://schemas.microsoft.com/office/mac/drawingml/2011/main" val="1"/>
+            </a:ext>
+          </a:extLst>
+        </p:spPr>
+        <p:txBody>
+          <a:bodyPr lIns="50800" tIns="50800" rIns="50800" bIns="50800" anchor="ctr">
+            <a:spAutoFit/>
+          </a:bodyPr>
+          <a:lstStyle>
+            <a:lvl1pPr algn="l">
+              <a:defRPr sz="1900"/>
+            </a:lvl1pPr>
+          </a:lstStyle>
+          <a:p>
+            <a:pPr/>
+            <a:r>
+              <a:t>Noam Chomsky</a:t>
+            </a:r>
+          </a:p>
+        </p:txBody>
+      </p:sp>
+      <p:sp>
+        <p:nvSpPr>
+          <p:cNvPr id="101" name="Shape 101"/>
+          <p:cNvSpPr/>
+          <p:nvPr/>
+        </p:nvSpPr>
+        <p:spPr>
+          <a:xfrm>
+            <a:off x="10556351" y="5835648"/>
             <a:ext cx="2463801" cy="393701"/>
           </a:xfrm>
           <a:prstGeom prst="rect">
@@ -5091,143 +5623,7 @@
           </a:bodyPr>
           <a:lstStyle>
             <a:lvl1pPr algn="l">
-              <a:defRPr sz="1900">
-                <a:solidFill>
-                  <a:srgbClr val="000000"/>
-                </a:solidFill>
-              </a:defRPr>
-            </a:lvl1pPr>
-          </a:lstStyle>
-          <a:p>
-            <a:pPr/>
-            <a:r>
-              <a:t>Slavoj Žižek</a:t>
-            </a:r>
-          </a:p>
-        </p:txBody>
-      </p:sp>
-      <p:sp>
-        <p:nvSpPr>
-          <p:cNvPr id="99" name="Shape 99"/>
-          <p:cNvSpPr/>
-          <p:nvPr/>
-        </p:nvSpPr>
-        <p:spPr>
-          <a:xfrm>
-            <a:off x="5270500" y="5835649"/>
-            <a:ext cx="2463800" cy="393701"/>
-          </a:xfrm>
-          <a:prstGeom prst="rect">
-            <a:avLst/>
-          </a:prstGeom>
-          <a:ln w="12700">
-            <a:miter lim="400000"/>
-          </a:ln>
-          <a:extLst>
-            <a:ext uri="{C572A759-6A51-4108-AA02-DFA0A04FC94B}">
-              <ma14:wrappingTextBoxFlag xmlns:ma14="http://schemas.microsoft.com/office/mac/drawingml/2011/main" val="1"/>
-            </a:ext>
-          </a:extLst>
-        </p:spPr>
-        <p:txBody>
-          <a:bodyPr lIns="50800" tIns="50800" rIns="50800" bIns="50800" anchor="ctr">
-            <a:spAutoFit/>
-          </a:bodyPr>
-          <a:lstStyle>
-            <a:lvl1pPr algn="l">
-              <a:defRPr sz="1900">
-                <a:solidFill>
-                  <a:srgbClr val="000000"/>
-                </a:solidFill>
-              </a:defRPr>
-            </a:lvl1pPr>
-          </a:lstStyle>
-          <a:p>
-            <a:pPr/>
-            <a:r>
-              <a:t>Franco “Bifo” Berardi</a:t>
-            </a:r>
-          </a:p>
-        </p:txBody>
-      </p:sp>
-      <p:sp>
-        <p:nvSpPr>
-          <p:cNvPr id="100" name="Shape 100"/>
-          <p:cNvSpPr/>
-          <p:nvPr/>
-        </p:nvSpPr>
-        <p:spPr>
-          <a:xfrm>
-            <a:off x="7912944" y="5835649"/>
-            <a:ext cx="2463801" cy="393701"/>
-          </a:xfrm>
-          <a:prstGeom prst="rect">
-            <a:avLst/>
-          </a:prstGeom>
-          <a:ln w="12700">
-            <a:miter lim="400000"/>
-          </a:ln>
-          <a:extLst>
-            <a:ext uri="{C572A759-6A51-4108-AA02-DFA0A04FC94B}">
-              <ma14:wrappingTextBoxFlag xmlns:ma14="http://schemas.microsoft.com/office/mac/drawingml/2011/main" val="1"/>
-            </a:ext>
-          </a:extLst>
-        </p:spPr>
-        <p:txBody>
-          <a:bodyPr lIns="50800" tIns="50800" rIns="50800" bIns="50800" anchor="ctr">
-            <a:spAutoFit/>
-          </a:bodyPr>
-          <a:lstStyle>
-            <a:lvl1pPr algn="l">
-              <a:defRPr sz="1900">
-                <a:solidFill>
-                  <a:srgbClr val="000000"/>
-                </a:solidFill>
-              </a:defRPr>
-            </a:lvl1pPr>
-          </a:lstStyle>
-          <a:p>
-            <a:pPr/>
-            <a:r>
-              <a:t>Noam Chomsky</a:t>
-            </a:r>
-          </a:p>
-        </p:txBody>
-      </p:sp>
-      <p:sp>
-        <p:nvSpPr>
-          <p:cNvPr id="101" name="Shape 101"/>
-          <p:cNvSpPr/>
-          <p:nvPr/>
-        </p:nvSpPr>
-        <p:spPr>
-          <a:xfrm>
-            <a:off x="10556351" y="5835649"/>
-            <a:ext cx="2463801" cy="393701"/>
-          </a:xfrm>
-          <a:prstGeom prst="rect">
-            <a:avLst/>
-          </a:prstGeom>
-          <a:ln w="12700">
-            <a:miter lim="400000"/>
-          </a:ln>
-          <a:extLst>
-            <a:ext uri="{C572A759-6A51-4108-AA02-DFA0A04FC94B}">
-              <ma14:wrappingTextBoxFlag xmlns:ma14="http://schemas.microsoft.com/office/mac/drawingml/2011/main" val="1"/>
-            </a:ext>
-          </a:extLst>
-        </p:spPr>
-        <p:txBody>
-          <a:bodyPr lIns="50800" tIns="50800" rIns="50800" bIns="50800" anchor="ctr">
-            <a:spAutoFit/>
-          </a:bodyPr>
-          <a:lstStyle>
-            <a:lvl1pPr algn="l">
-              <a:defRPr sz="1900">
-                <a:solidFill>
-                  <a:srgbClr val="000000"/>
-                </a:solidFill>
-              </a:defRPr>
+              <a:defRPr sz="1900"/>
             </a:lvl1pPr>
           </a:lstStyle>
           <a:p>
@@ -5275,7 +5671,7 @@
         <p:spPr>
           <a:xfrm>
             <a:off x="635000" y="887561"/>
-            <a:ext cx="8008751" cy="2159001"/>
+            <a:ext cx="8008750" cy="2159002"/>
           </a:xfrm>
           <a:prstGeom prst="rect">
             <a:avLst/>
@@ -5308,8 +5704,8 @@
         </p:nvSpPr>
         <p:spPr>
           <a:xfrm>
-            <a:off x="952500" y="2597150"/>
-            <a:ext cx="11099800" cy="6286501"/>
+            <a:off x="952500" y="2597149"/>
+            <a:ext cx="11099800" cy="6286503"/>
           </a:xfrm>
           <a:prstGeom prst="rect">
             <a:avLst/>
@@ -5355,13 +5751,13 @@
         <a:srgbClr val="000000"/>
       </a:dk1>
       <a:lt1>
-        <a:srgbClr val="FFFFFF"/>
+        <a:srgbClr val="ED3E23"/>
       </a:lt1>
       <a:dk2>
-        <a:srgbClr val="53585F"/>
+        <a:srgbClr val="A7A7A7"/>
       </a:dk2>
       <a:lt2>
-        <a:srgbClr val="DCDEE0"/>
+        <a:srgbClr val="535353"/>
       </a:lt2>
       <a:accent1>
         <a:srgbClr val="0065C1"/>
@@ -5390,14 +5786,14 @@
     </a:clrScheme>
     <a:fontScheme name="Black">
       <a:majorFont>
-        <a:latin typeface="Helvetica Light"/>
-        <a:ea typeface="Helvetica Light"/>
-        <a:cs typeface="Helvetica Light"/>
+        <a:latin typeface="Helvetica Neue"/>
+        <a:ea typeface="Helvetica Neue"/>
+        <a:cs typeface="Helvetica Neue"/>
       </a:majorFont>
       <a:minorFont>
-        <a:latin typeface="Helvetica Light"/>
-        <a:ea typeface="Helvetica Light"/>
-        <a:cs typeface="Helvetica Light"/>
+        <a:latin typeface="Helvetica"/>
+        <a:ea typeface="Helvetica"/>
+        <a:cs typeface="Helvetica"/>
       </a:minorFont>
     </a:fontScheme>
     <a:fmtScheme name="Black">
@@ -5537,14 +5933,15 @@
   <a:objectDefaults>
     <a:spDef>
       <a:spPr>
-        <a:blipFill rotWithShape="1">
-          <a:blip r:embed="rId1"/>
-          <a:srcRect l="0" t="0" r="0" b="0"/>
-          <a:tile tx="0" ty="0" sx="100000" sy="100000" flip="none" algn="tl"/>
-        </a:blipFill>
-        <a:ln w="12700" cap="flat">
-          <a:noFill/>
-          <a:miter lim="400000"/>
+        <a:solidFill>
+          <a:srgbClr val="FFFFFF"/>
+        </a:solidFill>
+        <a:ln w="25400" cap="flat">
+          <a:solidFill>
+            <a:schemeClr val="accent1"/>
+          </a:solidFill>
+          <a:prstDash val="solid"/>
+          <a:round/>
         </a:ln>
         <a:effectLst/>
         <a:sp3d/>
@@ -5568,18 +5965,18 @@
           <a:buFontTx/>
           <a:buNone/>
           <a:tabLst/>
-          <a:defRPr b="0" baseline="0" cap="none" i="0" spc="0" strike="noStrike" sz="2600" u="none" kumimoji="0" normalizeH="0">
+          <a:defRPr b="0" baseline="0" cap="none" i="0" spc="0" strike="noStrike" sz="3600" u="none" kumimoji="0" normalizeH="0">
             <a:ln>
               <a:noFill/>
             </a:ln>
             <a:solidFill>
-              <a:srgbClr val="FFFFFF"/>
+              <a:srgbClr val="000000"/>
             </a:solidFill>
             <a:effectLst/>
             <a:uFillTx/>
-            <a:latin typeface="+mn-lt"/>
-            <a:ea typeface="+mn-ea"/>
-            <a:cs typeface="+mn-cs"/>
+            <a:latin typeface="Helvetica Light"/>
+            <a:ea typeface="Helvetica Light"/>
+            <a:cs typeface="Helvetica Light"/>
             <a:sym typeface="Helvetica Light"/>
           </a:defRPr>
         </a:defPPr>
@@ -5830,10 +6227,10 @@
         <a:noFill/>
         <a:ln w="25400" cap="flat">
           <a:solidFill>
-            <a:srgbClr val="FFFFFF"/>
+            <a:schemeClr val="accent1"/>
           </a:solidFill>
           <a:prstDash val="solid"/>
-          <a:miter lim="400000"/>
+          <a:round/>
         </a:ln>
         <a:effectLst/>
         <a:sp3d/>
@@ -6144,13 +6541,13 @@
               <a:noFill/>
             </a:ln>
             <a:solidFill>
-              <a:srgbClr val="FFFFFF"/>
+              <a:srgbClr val="000000"/>
             </a:solidFill>
             <a:effectLst/>
             <a:uFillTx/>
-            <a:latin typeface="+mn-lt"/>
-            <a:ea typeface="+mn-ea"/>
-            <a:cs typeface="+mn-cs"/>
+            <a:latin typeface="Helvetica Light"/>
+            <a:ea typeface="Helvetica Light"/>
+            <a:cs typeface="Helvetica Light"/>
             <a:sym typeface="Helvetica Light"/>
           </a:defRPr>
         </a:defPPr>
@@ -6411,10 +6808,10 @@
         <a:srgbClr val="FFFFFF"/>
       </a:lt1>
       <a:dk2>
-        <a:srgbClr val="53585F"/>
+        <a:srgbClr val="A7A7A7"/>
       </a:dk2>
       <a:lt2>
-        <a:srgbClr val="DCDEE0"/>
+        <a:srgbClr val="535353"/>
       </a:lt2>
       <a:accent1>
         <a:srgbClr val="0065C1"/>
@@ -6443,14 +6840,14 @@
     </a:clrScheme>
     <a:fontScheme name="Black">
       <a:majorFont>
-        <a:latin typeface="Helvetica Light"/>
-        <a:ea typeface="Helvetica Light"/>
-        <a:cs typeface="Helvetica Light"/>
+        <a:latin typeface="Helvetica Neue"/>
+        <a:ea typeface="Helvetica Neue"/>
+        <a:cs typeface="Helvetica Neue"/>
       </a:majorFont>
       <a:minorFont>
-        <a:latin typeface="Helvetica Light"/>
-        <a:ea typeface="Helvetica Light"/>
-        <a:cs typeface="Helvetica Light"/>
+        <a:latin typeface="Helvetica"/>
+        <a:ea typeface="Helvetica"/>
+        <a:cs typeface="Helvetica"/>
       </a:minorFont>
     </a:fontScheme>
     <a:fmtScheme name="Black">
@@ -6590,14 +6987,15 @@
   <a:objectDefaults>
     <a:spDef>
       <a:spPr>
-        <a:blipFill rotWithShape="1">
-          <a:blip r:embed="rId1"/>
-          <a:srcRect l="0" t="0" r="0" b="0"/>
-          <a:tile tx="0" ty="0" sx="100000" sy="100000" flip="none" algn="tl"/>
-        </a:blipFill>
-        <a:ln w="12700" cap="flat">
-          <a:noFill/>
-          <a:miter lim="400000"/>
+        <a:solidFill>
+          <a:srgbClr val="FFFFFF"/>
+        </a:solidFill>
+        <a:ln w="25400" cap="flat">
+          <a:solidFill>
+            <a:schemeClr val="accent1"/>
+          </a:solidFill>
+          <a:prstDash val="solid"/>
+          <a:round/>
         </a:ln>
         <a:effectLst/>
         <a:sp3d/>
@@ -6621,18 +7019,18 @@
           <a:buFontTx/>
           <a:buNone/>
           <a:tabLst/>
-          <a:defRPr b="0" baseline="0" cap="none" i="0" spc="0" strike="noStrike" sz="2600" u="none" kumimoji="0" normalizeH="0">
+          <a:defRPr b="0" baseline="0" cap="none" i="0" spc="0" strike="noStrike" sz="3600" u="none" kumimoji="0" normalizeH="0">
             <a:ln>
               <a:noFill/>
             </a:ln>
             <a:solidFill>
-              <a:srgbClr val="FFFFFF"/>
+              <a:srgbClr val="000000"/>
             </a:solidFill>
             <a:effectLst/>
             <a:uFillTx/>
-            <a:latin typeface="+mn-lt"/>
-            <a:ea typeface="+mn-ea"/>
-            <a:cs typeface="+mn-cs"/>
+            <a:latin typeface="Helvetica Light"/>
+            <a:ea typeface="Helvetica Light"/>
+            <a:cs typeface="Helvetica Light"/>
             <a:sym typeface="Helvetica Light"/>
           </a:defRPr>
         </a:defPPr>
@@ -6883,10 +7281,10 @@
         <a:noFill/>
         <a:ln w="25400" cap="flat">
           <a:solidFill>
-            <a:srgbClr val="FFFFFF"/>
+            <a:schemeClr val="accent1"/>
           </a:solidFill>
           <a:prstDash val="solid"/>
-          <a:miter lim="400000"/>
+          <a:round/>
         </a:ln>
         <a:effectLst/>
         <a:sp3d/>
@@ -7197,13 +7595,13 @@
               <a:noFill/>
             </a:ln>
             <a:solidFill>
-              <a:srgbClr val="FFFFFF"/>
+              <a:srgbClr val="000000"/>
             </a:solidFill>
             <a:effectLst/>
             <a:uFillTx/>
-            <a:latin typeface="+mn-lt"/>
-            <a:ea typeface="+mn-ea"/>
-            <a:cs typeface="+mn-cs"/>
+            <a:latin typeface="Helvetica Light"/>
+            <a:ea typeface="Helvetica Light"/>
+            <a:cs typeface="Helvetica Light"/>
             <a:sym typeface="Helvetica Light"/>
           </a:defRPr>
         </a:defPPr>

</xml_diff>